<commit_message>
Finalized. The session was good!
</commit_message>
<xml_diff>
--- a/WeaselWords-DotnetDevCon.pptx
+++ b/WeaselWords-DotnetDevCon.pptx
@@ -5,7 +5,7 @@
     <p:sldMasterId id="2147483648" r:id="rId1"/>
   </p:sldMasterIdLst>
   <p:notesMasterIdLst>
-    <p:notesMasterId r:id="rId125"/>
+    <p:notesMasterId r:id="rId126"/>
   </p:notesMasterIdLst>
   <p:sldIdLst>
     <p:sldId id="327" r:id="rId2"/>
@@ -124,13 +124,14 @@
     <p:sldId id="525" r:id="rId115"/>
     <p:sldId id="526" r:id="rId116"/>
     <p:sldId id="527" r:id="rId117"/>
-    <p:sldId id="528" r:id="rId118"/>
-    <p:sldId id="529" r:id="rId119"/>
-    <p:sldId id="530" r:id="rId120"/>
-    <p:sldId id="524" r:id="rId121"/>
-    <p:sldId id="474" r:id="rId122"/>
-    <p:sldId id="306" r:id="rId123"/>
-    <p:sldId id="296" r:id="rId124"/>
+    <p:sldId id="531" r:id="rId118"/>
+    <p:sldId id="528" r:id="rId119"/>
+    <p:sldId id="529" r:id="rId120"/>
+    <p:sldId id="530" r:id="rId121"/>
+    <p:sldId id="524" r:id="rId122"/>
+    <p:sldId id="474" r:id="rId123"/>
+    <p:sldId id="306" r:id="rId124"/>
+    <p:sldId id="296" r:id="rId125"/>
   </p:sldIdLst>
   <p:sldSz cx="9144000" cy="6858000" type="screen4x3"/>
   <p:notesSz cx="7099300" cy="10234613"/>
@@ -315,7 +316,7 @@
             <a:fld id="{387BDB18-914D-4BFD-8CA5-9EA31C659A99}" type="datetimeFigureOut">
               <a:rPr lang="en-US" smtClean="0"/>
               <a:pPr/>
-              <a:t>5/14/2012</a:t>
+              <a:t>5/15/2012</a:t>
             </a:fld>
             <a:endParaRPr lang="en-US"/>
           </a:p>
@@ -983,7 +984,7 @@
             <a:fld id="{1BA50D42-C9CD-4801-B293-61D1F53EC57E}" type="datetimeFigureOut">
               <a:rPr lang="de-DE" smtClean="0"/>
               <a:pPr/>
-              <a:t>14.05.2012</a:t>
+              <a:t>15.05.2012</a:t>
             </a:fld>
             <a:endParaRPr lang="de-DE"/>
           </a:p>
@@ -1187,7 +1188,7 @@
             <a:fld id="{1BA50D42-C9CD-4801-B293-61D1F53EC57E}" type="datetimeFigureOut">
               <a:rPr lang="de-DE" smtClean="0"/>
               <a:pPr/>
-              <a:t>14.05.2012</a:t>
+              <a:t>15.05.2012</a:t>
             </a:fld>
             <a:endParaRPr lang="de-DE"/>
           </a:p>
@@ -1399,7 +1400,7 @@
             <a:fld id="{49009F1C-25D2-4D02-B5E1-1CF1D044B88A}" type="datetime1">
               <a:rPr lang="de-DE" smtClean="0"/>
               <a:pPr/>
-              <a:t>14.05.2012</a:t>
+              <a:t>15.05.2012</a:t>
             </a:fld>
             <a:endParaRPr lang="de-DE"/>
           </a:p>
@@ -1735,7 +1736,7 @@
             <a:fld id="{1BA50D42-C9CD-4801-B293-61D1F53EC57E}" type="datetimeFigureOut">
               <a:rPr lang="de-DE" smtClean="0"/>
               <a:pPr/>
-              <a:t>14.05.2012</a:t>
+              <a:t>15.05.2012</a:t>
             </a:fld>
             <a:endParaRPr lang="de-DE"/>
           </a:p>
@@ -2050,7 +2051,7 @@
             <a:fld id="{1BA50D42-C9CD-4801-B293-61D1F53EC57E}" type="datetimeFigureOut">
               <a:rPr lang="de-DE" smtClean="0"/>
               <a:pPr/>
-              <a:t>14.05.2012</a:t>
+              <a:t>15.05.2012</a:t>
             </a:fld>
             <a:endParaRPr lang="de-DE"/>
           </a:p>
@@ -2505,7 +2506,7 @@
             <a:fld id="{1BA50D42-C9CD-4801-B293-61D1F53EC57E}" type="datetimeFigureOut">
               <a:rPr lang="de-DE" smtClean="0"/>
               <a:pPr/>
-              <a:t>14.05.2012</a:t>
+              <a:t>15.05.2012</a:t>
             </a:fld>
             <a:endParaRPr lang="de-DE"/>
           </a:p>
@@ -2644,7 +2645,7 @@
             <a:fld id="{1BA50D42-C9CD-4801-B293-61D1F53EC57E}" type="datetimeFigureOut">
               <a:rPr lang="de-DE" smtClean="0"/>
               <a:pPr/>
-              <a:t>14.05.2012</a:t>
+              <a:t>15.05.2012</a:t>
             </a:fld>
             <a:endParaRPr lang="de-DE"/>
           </a:p>
@@ -2760,7 +2761,7 @@
             <a:fld id="{1BA50D42-C9CD-4801-B293-61D1F53EC57E}" type="datetimeFigureOut">
               <a:rPr lang="de-DE" smtClean="0"/>
               <a:pPr/>
-              <a:t>14.05.2012</a:t>
+              <a:t>15.05.2012</a:t>
             </a:fld>
             <a:endParaRPr lang="de-DE"/>
           </a:p>
@@ -3064,7 +3065,7 @@
             <a:fld id="{1BA50D42-C9CD-4801-B293-61D1F53EC57E}" type="datetimeFigureOut">
               <a:rPr lang="de-DE" smtClean="0"/>
               <a:pPr/>
-              <a:t>14.05.2012</a:t>
+              <a:t>15.05.2012</a:t>
             </a:fld>
             <a:endParaRPr lang="de-DE"/>
           </a:p>
@@ -3344,7 +3345,7 @@
             <a:fld id="{1BA50D42-C9CD-4801-B293-61D1F53EC57E}" type="datetimeFigureOut">
               <a:rPr lang="de-DE" smtClean="0"/>
               <a:pPr/>
-              <a:t>14.05.2012</a:t>
+              <a:t>15.05.2012</a:t>
             </a:fld>
             <a:endParaRPr lang="de-DE"/>
           </a:p>
@@ -4780,6 +4781,13 @@
   <p:clrMapOvr>
     <a:masterClrMapping/>
   </p:clrMapOvr>
+  <p:timing>
+    <p:tnLst>
+      <p:par>
+        <p:cTn id="1" dur="indefinite" restart="never" nodeType="tmRoot"/>
+      </p:par>
+    </p:tnLst>
+  </p:timing>
 </p:sld>
 </file>
 
@@ -4883,20 +4891,7 @@
                 <a:latin typeface="Roboto" pitchFamily="2" charset="0"/>
                 <a:ea typeface="Roboto" pitchFamily="2" charset="0"/>
               </a:rPr>
-              <a:t> is the most powerful. It changes the way people see code and lets them notice possibilities that they might not have considered before" </a:t>
-            </a:r>
-            <a:r>
-              <a:rPr lang="en-US" sz="4400" dirty="0" smtClean="0">
-                <a:solidFill>
-                  <a:schemeClr val="tx1">
-                    <a:lumMod val="50000"/>
-                    <a:lumOff val="50000"/>
-                  </a:schemeClr>
-                </a:solidFill>
-                <a:latin typeface="Roboto" pitchFamily="2" charset="0"/>
-                <a:ea typeface="Roboto" pitchFamily="2" charset="0"/>
-              </a:rPr>
-              <a:t> </a:t>
+              <a:t> is the most powerful. It changes the way people see code and lets them notice possibilities that they might not have considered before"  </a:t>
             </a:r>
             <a:r>
               <a:rPr lang="en-US" sz="4400" dirty="0" smtClean="0">
@@ -7380,80 +7375,195 @@
           </a:bodyPr>
           <a:lstStyle/>
           <a:p>
+            <a:pPr algn="l"/>
+            <a:r>
+              <a:rPr lang="en-US" sz="2000" b="1" dirty="0">
+                <a:solidFill>
+                  <a:schemeClr val="bg1"/>
+                </a:solidFill>
+                <a:latin typeface="Consolas"/>
+              </a:rPr>
+              <a:t> </a:t>
+            </a:r>
             <a:r>
               <a:rPr lang="en-US" sz="2000" b="1" dirty="0" smtClean="0">
                 <a:solidFill>
                   <a:schemeClr val="bg1"/>
                 </a:solidFill>
-                <a:latin typeface="Consolas" pitchFamily="49" charset="0"/>
-                <a:ea typeface="Roboto" pitchFamily="2" charset="0"/>
-                <a:cs typeface="Consolas" pitchFamily="49" charset="0"/>
+                <a:latin typeface="Consolas"/>
+              </a:rPr>
+              <a:t> public </a:t>
+            </a:r>
+            <a:r>
+              <a:rPr lang="en-US" sz="2000" b="1" dirty="0">
+                <a:solidFill>
+                  <a:schemeClr val="bg1"/>
+                </a:solidFill>
+                <a:latin typeface="Consolas"/>
+              </a:rPr>
+              <a:t>interface </a:t>
+            </a:r>
+            <a:r>
+              <a:rPr lang="en-US" sz="2000" b="1" dirty="0" err="1">
+                <a:solidFill>
+                  <a:schemeClr val="bg1"/>
+                </a:solidFill>
+                <a:latin typeface="Consolas"/>
+              </a:rPr>
+              <a:t>IFindCustomers</a:t>
+            </a:r>
+            <a:r>
+              <a:rPr lang="en-US" sz="2000" b="1" dirty="0">
+                <a:solidFill>
+                  <a:schemeClr val="bg1"/>
+                </a:solidFill>
+                <a:latin typeface="Consolas"/>
               </a:rPr>
               <a:t> </a:t>
-            </a:r>
-            <a:r>
-              <a:rPr lang="en-US" sz="2000" b="1" dirty="0" err="1" smtClean="0">
-                <a:solidFill>
-                  <a:schemeClr val="bg1"/>
-                </a:solidFill>
-                <a:latin typeface="Consolas" pitchFamily="49" charset="0"/>
-                <a:ea typeface="Roboto" pitchFamily="2" charset="0"/>
-                <a:cs typeface="Consolas" pitchFamily="49" charset="0"/>
-              </a:rPr>
-              <a:t>Iformatter</a:t>
-            </a:r>
-            <a:r>
-              <a:rPr lang="en-US" sz="2000" b="1" dirty="0" smtClean="0">
-                <a:solidFill>
-                  <a:schemeClr val="bg1"/>
-                </a:solidFill>
-                <a:latin typeface="Consolas" pitchFamily="49" charset="0"/>
-                <a:ea typeface="Roboto" pitchFamily="2" charset="0"/>
-                <a:cs typeface="Consolas" pitchFamily="49" charset="0"/>
-              </a:rPr>
-              <a:t/>
-            </a:r>
-            <a:br>
-              <a:rPr lang="en-US" sz="2000" b="1" dirty="0" smtClean="0">
-                <a:solidFill>
-                  <a:schemeClr val="bg1"/>
-                </a:solidFill>
-                <a:latin typeface="Consolas" pitchFamily="49" charset="0"/>
-                <a:ea typeface="Roboto" pitchFamily="2" charset="0"/>
-                <a:cs typeface="Consolas" pitchFamily="49" charset="0"/>
-              </a:rPr>
-            </a:br>
-            <a:r>
-              <a:rPr lang="en-US" sz="2000" b="1" dirty="0">
-                <a:solidFill>
-                  <a:schemeClr val="bg1"/>
-                </a:solidFill>
-                <a:latin typeface="Consolas" pitchFamily="49" charset="0"/>
-                <a:ea typeface="Roboto" pitchFamily="2" charset="0"/>
-                <a:cs typeface="Consolas" pitchFamily="49" charset="0"/>
-              </a:rPr>
-              <a:t/>
             </a:r>
             <a:br>
               <a:rPr lang="en-US" sz="2000" b="1" dirty="0">
                 <a:solidFill>
                   <a:schemeClr val="bg1"/>
                 </a:solidFill>
-                <a:latin typeface="Consolas" pitchFamily="49" charset="0"/>
-                <a:ea typeface="Roboto" pitchFamily="2" charset="0"/>
-                <a:cs typeface="Consolas" pitchFamily="49" charset="0"/>
+                <a:latin typeface="Consolas"/>
               </a:rPr>
             </a:br>
             <a:r>
-              <a:rPr lang="en-US" sz="2000" b="1" dirty="0" err="1" smtClean="0">
-                <a:solidFill>
-                  <a:schemeClr val="bg1"/>
-                </a:solidFill>
-                <a:latin typeface="Consolas" pitchFamily="49" charset="0"/>
-                <a:ea typeface="Roboto" pitchFamily="2" charset="0"/>
-                <a:cs typeface="Consolas" pitchFamily="49" charset="0"/>
-              </a:rPr>
-              <a:t>IFormat</a:t>
+              <a:rPr lang="en-US" sz="2000" b="1" dirty="0" smtClean="0">
+                <a:solidFill>
+                  <a:schemeClr val="bg1"/>
+                </a:solidFill>
+                <a:latin typeface="Consolas"/>
+              </a:rPr>
+              <a:t>  { </a:t>
+            </a:r>
+            <a:r>
+              <a:rPr lang="en-US" sz="2000" b="1" dirty="0">
+                <a:solidFill>
+                  <a:schemeClr val="bg1"/>
+                </a:solidFill>
+                <a:latin typeface="Consolas"/>
+              </a:rPr>
+              <a:t/>
+            </a:r>
+            <a:br>
+              <a:rPr lang="en-US" sz="2000" b="1" dirty="0">
+                <a:solidFill>
+                  <a:schemeClr val="bg1"/>
+                </a:solidFill>
+                <a:latin typeface="Consolas"/>
+              </a:rPr>
+            </a:br>
+            <a:r>
+              <a:rPr lang="en-US" sz="2000" b="1" dirty="0">
+                <a:solidFill>
+                  <a:schemeClr val="bg1"/>
+                </a:solidFill>
+                <a:latin typeface="Consolas"/>
+              </a:rPr>
+              <a:t>	</a:t>
+            </a:r>
+            <a:r>
+              <a:rPr lang="en-US" sz="2000" b="1" dirty="0" err="1">
+                <a:solidFill>
+                  <a:schemeClr val="bg1"/>
+                </a:solidFill>
+                <a:latin typeface="Consolas"/>
+              </a:rPr>
+              <a:t>IEnumerable</a:t>
+            </a:r>
+            <a:r>
+              <a:rPr lang="en-US" sz="2000" b="1" dirty="0">
+                <a:solidFill>
+                  <a:schemeClr val="bg1"/>
+                </a:solidFill>
+                <a:latin typeface="Consolas"/>
+              </a:rPr>
+              <a:t> &lt;Customer&gt; </a:t>
+            </a:r>
+            <a:r>
+              <a:rPr lang="en-US" sz="2000" b="1" dirty="0" err="1">
+                <a:solidFill>
+                  <a:schemeClr val="bg1"/>
+                </a:solidFill>
+                <a:latin typeface="Consolas"/>
+              </a:rPr>
+              <a:t>BornIn</a:t>
+            </a:r>
+            <a:r>
+              <a:rPr lang="en-US" sz="2000" b="1" dirty="0">
+                <a:solidFill>
+                  <a:schemeClr val="bg1"/>
+                </a:solidFill>
+                <a:latin typeface="Consolas"/>
+              </a:rPr>
+              <a:t>(</a:t>
+            </a:r>
+            <a:r>
+              <a:rPr lang="en-US" sz="2000" b="1" dirty="0" err="1">
+                <a:latin typeface="Consolas"/>
+              </a:rPr>
+              <a:t>DateTime</a:t>
+            </a:r>
+            <a:r>
+              <a:rPr lang="en-US" sz="2000" b="1" dirty="0">
+                <a:latin typeface="Consolas"/>
+              </a:rPr>
+              <a:t> </a:t>
+            </a:r>
+            <a:r>
+              <a:rPr lang="en-US" sz="2000" b="1" dirty="0" smtClean="0">
+                <a:solidFill>
+                  <a:srgbClr val="FF00FF"/>
+                </a:solidFill>
+                <a:latin typeface="Consolas"/>
+              </a:rPr>
+              <a:t>year</a:t>
+            </a:r>
+            <a:r>
+              <a:rPr lang="en-US" sz="2000" b="1" dirty="0" smtClean="0">
+                <a:solidFill>
+                  <a:schemeClr val="bg1"/>
+                </a:solidFill>
+                <a:latin typeface="Consolas"/>
+              </a:rPr>
+              <a:t>);</a:t>
+            </a:r>
+            <a:r>
+              <a:rPr lang="en-US" sz="2000" b="1" dirty="0">
+                <a:solidFill>
+                  <a:schemeClr val="bg1"/>
+                </a:solidFill>
+                <a:latin typeface="Consolas"/>
+              </a:rPr>
+              <a:t/>
+            </a:r>
+            <a:br>
+              <a:rPr lang="en-US" sz="2000" b="1" dirty="0">
+                <a:solidFill>
+                  <a:schemeClr val="bg1"/>
+                </a:solidFill>
+                <a:latin typeface="Consolas"/>
+              </a:rPr>
+            </a:br>
+            <a:r>
+              <a:rPr lang="en-US" sz="2000" b="1" dirty="0" smtClean="0">
+                <a:solidFill>
+                  <a:schemeClr val="bg1"/>
+                </a:solidFill>
+                <a:latin typeface="Consolas"/>
+              </a:rPr>
+              <a:t>  </a:t>
+            </a:r>
+            <a:r>
+              <a:rPr lang="en-US" sz="2000" b="1" dirty="0" smtClean="0">
+                <a:solidFill>
+                  <a:schemeClr val="bg1"/>
+                </a:solidFill>
+                <a:latin typeface="Consolas"/>
+              </a:rPr>
+              <a:t>}</a:t>
             </a:r>
             <a:endParaRPr lang="en-US" sz="2000" b="1" dirty="0">
               <a:solidFill>
@@ -7469,7 +7579,7 @@
     </p:spTree>
     <p:extLst>
       <p:ext uri="{BB962C8B-B14F-4D97-AF65-F5344CB8AC3E}">
-        <p14:creationId xmlns:p14="http://schemas.microsoft.com/office/powerpoint/2010/main" val="3705054776"/>
+        <p14:creationId xmlns:p14="http://schemas.microsoft.com/office/powerpoint/2010/main" val="293374804"/>
       </p:ext>
     </p:extLst>
   </p:cSld>
@@ -7532,6 +7642,17 @@
           <a:lstStyle/>
           <a:p>
             <a:r>
+              <a:rPr lang="en-US" sz="2000" b="1" dirty="0" smtClean="0">
+                <a:solidFill>
+                  <a:schemeClr val="bg1"/>
+                </a:solidFill>
+                <a:latin typeface="Consolas" pitchFamily="49" charset="0"/>
+                <a:ea typeface="Roboto" pitchFamily="2" charset="0"/>
+                <a:cs typeface="Consolas" pitchFamily="49" charset="0"/>
+              </a:rPr>
+              <a:t> </a:t>
+            </a:r>
+            <a:r>
               <a:rPr lang="en-US" sz="2000" b="1" dirty="0" err="1" smtClean="0">
                 <a:solidFill>
                   <a:schemeClr val="bg1"/>
@@ -7540,7 +7661,7 @@
                 <a:ea typeface="Roboto" pitchFamily="2" charset="0"/>
                 <a:cs typeface="Consolas" pitchFamily="49" charset="0"/>
               </a:rPr>
-              <a:t>IObserver</a:t>
+              <a:t>Iformatter</a:t>
             </a:r>
             <a:r>
               <a:rPr lang="en-US" sz="2000" b="1" dirty="0" smtClean="0">
@@ -7593,7 +7714,7 @@
                 <a:ea typeface="Roboto" pitchFamily="2" charset="0"/>
                 <a:cs typeface="Consolas" pitchFamily="49" charset="0"/>
               </a:rPr>
-              <a:t>IObserve</a:t>
+              <a:t>IFormat</a:t>
             </a:r>
             <a:endParaRPr lang="en-US" sz="2000" b="1" dirty="0">
               <a:solidFill>
@@ -7609,7 +7730,7 @@
     </p:spTree>
     <p:extLst>
       <p:ext uri="{BB962C8B-B14F-4D97-AF65-F5344CB8AC3E}">
-        <p14:creationId xmlns:p14="http://schemas.microsoft.com/office/powerpoint/2010/main" val="3715002187"/>
+        <p14:creationId xmlns:p14="http://schemas.microsoft.com/office/powerpoint/2010/main" val="3705054776"/>
       </p:ext>
     </p:extLst>
   </p:cSld>
@@ -7645,7 +7766,7 @@
       </p:grpSpPr>
       <p:sp>
         <p:nvSpPr>
-          <p:cNvPr id="3" name="Titel 2"/>
+          <p:cNvPr id="2" name="Titel 1"/>
           <p:cNvSpPr>
             <a:spLocks noGrp="1"/>
           </p:cNvSpPr>
@@ -7653,62 +7774,116 @@
             <p:ph type="title"/>
           </p:nvPr>
         </p:nvSpPr>
-        <p:spPr/>
-        <p:txBody>
-          <a:bodyPr/>
+        <p:spPr>
+          <a:xfrm>
+            <a:off x="0" y="0"/>
+            <a:ext cx="9144000" cy="6858000"/>
+          </a:xfrm>
+          <a:solidFill>
+            <a:schemeClr val="tx1">
+              <a:lumMod val="85000"/>
+              <a:lumOff val="15000"/>
+            </a:schemeClr>
+          </a:solidFill>
+        </p:spPr>
+        <p:txBody>
+          <a:bodyPr>
+            <a:normAutofit/>
+          </a:bodyPr>
           <a:lstStyle/>
           <a:p>
             <a:r>
-              <a:rPr lang="de-DE" dirty="0" smtClean="0"/>
-              <a:t>Interfaces </a:t>
+              <a:rPr lang="en-US" sz="2000" b="1" dirty="0" err="1" smtClean="0">
+                <a:solidFill>
+                  <a:schemeClr val="bg1"/>
+                </a:solidFill>
+                <a:latin typeface="Consolas" pitchFamily="49" charset="0"/>
+                <a:ea typeface="Roboto" pitchFamily="2" charset="0"/>
+                <a:cs typeface="Consolas" pitchFamily="49" charset="0"/>
+              </a:rPr>
+              <a:t>IObserver</a:t>
+            </a:r>
+            <a:r>
+              <a:rPr lang="en-US" sz="2000" b="1" dirty="0" smtClean="0">
+                <a:solidFill>
+                  <a:schemeClr val="bg1"/>
+                </a:solidFill>
+                <a:latin typeface="Consolas" pitchFamily="49" charset="0"/>
+                <a:ea typeface="Roboto" pitchFamily="2" charset="0"/>
+                <a:cs typeface="Consolas" pitchFamily="49" charset="0"/>
+              </a:rPr>
+              <a:t/>
             </a:r>
             <a:br>
-              <a:rPr lang="de-DE" dirty="0" smtClean="0"/>
+              <a:rPr lang="en-US" sz="2000" b="1" dirty="0" smtClean="0">
+                <a:solidFill>
+                  <a:schemeClr val="bg1"/>
+                </a:solidFill>
+                <a:latin typeface="Consolas" pitchFamily="49" charset="0"/>
+                <a:ea typeface="Roboto" pitchFamily="2" charset="0"/>
+                <a:cs typeface="Consolas" pitchFamily="49" charset="0"/>
+              </a:rPr>
             </a:br>
             <a:r>
-              <a:rPr lang="de-DE" dirty="0" smtClean="0"/>
-              <a:t>definieren </a:t>
-            </a:r>
-            <a:r>
-              <a:rPr lang="de-DE" dirty="0" smtClean="0">
-                <a:solidFill>
-                  <a:srgbClr val="FF00FF"/>
-                </a:solidFill>
-              </a:rPr>
-              <a:t>verhalten</a:t>
-            </a:r>
-            <a:r>
-              <a:rPr lang="de-DE" dirty="0" smtClean="0"/>
-              <a:t>. </a:t>
+              <a:rPr lang="en-US" sz="2000" b="1" dirty="0">
+                <a:solidFill>
+                  <a:schemeClr val="bg1"/>
+                </a:solidFill>
+                <a:latin typeface="Consolas" pitchFamily="49" charset="0"/>
+                <a:ea typeface="Roboto" pitchFamily="2" charset="0"/>
+                <a:cs typeface="Consolas" pitchFamily="49" charset="0"/>
+              </a:rPr>
+              <a:t/>
             </a:r>
             <a:br>
-              <a:rPr lang="de-DE" dirty="0" smtClean="0"/>
+              <a:rPr lang="en-US" sz="2000" b="1" dirty="0">
+                <a:solidFill>
+                  <a:schemeClr val="bg1"/>
+                </a:solidFill>
+                <a:latin typeface="Consolas" pitchFamily="49" charset="0"/>
+                <a:ea typeface="Roboto" pitchFamily="2" charset="0"/>
+                <a:cs typeface="Consolas" pitchFamily="49" charset="0"/>
+              </a:rPr>
             </a:br>
             <a:r>
-              <a:rPr lang="de-DE" dirty="0"/>
-              <a:t/>
-            </a:r>
-            <a:br>
-              <a:rPr lang="de-DE" dirty="0"/>
-            </a:br>
-            <a:r>
-              <a:rPr lang="de-DE" dirty="0" smtClean="0"/>
-              <a:t>Warum nennen wir sie nicht so?</a:t>
-            </a:r>
-            <a:endParaRPr lang="de-DE" dirty="0"/>
+              <a:rPr lang="en-US" sz="2000" b="1" dirty="0" err="1" smtClean="0">
+                <a:solidFill>
+                  <a:schemeClr val="bg1"/>
+                </a:solidFill>
+                <a:latin typeface="Consolas" pitchFamily="49" charset="0"/>
+                <a:ea typeface="Roboto" pitchFamily="2" charset="0"/>
+                <a:cs typeface="Consolas" pitchFamily="49" charset="0"/>
+              </a:rPr>
+              <a:t>IObserve</a:t>
+            </a:r>
+            <a:endParaRPr lang="en-US" sz="2000" b="1" dirty="0">
+              <a:solidFill>
+                <a:schemeClr val="bg1"/>
+              </a:solidFill>
+              <a:latin typeface="Consolas" pitchFamily="49" charset="0"/>
+              <a:ea typeface="Roboto" pitchFamily="2" charset="0"/>
+              <a:cs typeface="Consolas" pitchFamily="49" charset="0"/>
+            </a:endParaRPr>
           </a:p>
         </p:txBody>
       </p:sp>
     </p:spTree>
     <p:extLst>
       <p:ext uri="{BB962C8B-B14F-4D97-AF65-F5344CB8AC3E}">
-        <p14:creationId xmlns:p14="http://schemas.microsoft.com/office/powerpoint/2010/main" val="4164306444"/>
+        <p14:creationId xmlns:p14="http://schemas.microsoft.com/office/powerpoint/2010/main" val="3715002187"/>
       </p:ext>
     </p:extLst>
   </p:cSld>
   <p:clrMapOvr>
     <a:masterClrMapping/>
   </p:clrMapOvr>
+  <p:timing>
+    <p:tnLst>
+      <p:par>
+        <p:cTn id="1" dur="indefinite" restart="never" nodeType="tmRoot"/>
+      </p:par>
+    </p:tnLst>
+  </p:timing>
 </p:sld>
 </file>
 
@@ -7840,7 +8015,7 @@
       </p:grpSpPr>
       <p:sp>
         <p:nvSpPr>
-          <p:cNvPr id="2" name="Titel 1"/>
+          <p:cNvPr id="3" name="Titel 2"/>
           <p:cNvSpPr>
             <a:spLocks noGrp="1"/>
           </p:cNvSpPr>
@@ -7855,7 +8030,40 @@
           <a:p>
             <a:r>
               <a:rPr lang="de-DE" dirty="0" smtClean="0"/>
-              <a:t>I Do Something For You</a:t>
+              <a:t>Interfaces </a:t>
+            </a:r>
+            <a:br>
+              <a:rPr lang="de-DE" dirty="0" smtClean="0"/>
+            </a:br>
+            <a:r>
+              <a:rPr lang="de-DE" dirty="0" smtClean="0"/>
+              <a:t>definieren </a:t>
+            </a:r>
+            <a:r>
+              <a:rPr lang="de-DE" dirty="0" smtClean="0">
+                <a:solidFill>
+                  <a:srgbClr val="FF00FF"/>
+                </a:solidFill>
+              </a:rPr>
+              <a:t>verhalten</a:t>
+            </a:r>
+            <a:r>
+              <a:rPr lang="de-DE" dirty="0" smtClean="0"/>
+              <a:t>. </a:t>
+            </a:r>
+            <a:br>
+              <a:rPr lang="de-DE" dirty="0" smtClean="0"/>
+            </a:br>
+            <a:r>
+              <a:rPr lang="de-DE" dirty="0"/>
+              <a:t/>
+            </a:r>
+            <a:br>
+              <a:rPr lang="de-DE" dirty="0"/>
+            </a:br>
+            <a:r>
+              <a:rPr lang="de-DE" dirty="0" smtClean="0"/>
+              <a:t>Warum nennen wir sie nicht so?</a:t>
             </a:r>
             <a:endParaRPr lang="de-DE" dirty="0"/>
           </a:p>
@@ -7864,13 +8072,20 @@
     </p:spTree>
     <p:extLst>
       <p:ext uri="{BB962C8B-B14F-4D97-AF65-F5344CB8AC3E}">
-        <p14:creationId xmlns:p14="http://schemas.microsoft.com/office/powerpoint/2010/main" val="2259103098"/>
+        <p14:creationId xmlns:p14="http://schemas.microsoft.com/office/powerpoint/2010/main" val="4164306444"/>
       </p:ext>
     </p:extLst>
   </p:cSld>
   <p:clrMapOvr>
     <a:masterClrMapping/>
   </p:clrMapOvr>
+  <p:timing>
+    <p:tnLst>
+      <p:par>
+        <p:cTn id="1" dur="indefinite" restart="never" nodeType="tmRoot"/>
+      </p:par>
+    </p:tnLst>
+  </p:timing>
 </p:sld>
 </file>
 
@@ -7908,35 +8123,18 @@
           <a:p>
             <a:r>
               <a:rPr lang="de-DE" dirty="0" smtClean="0"/>
-              <a:t>Systemische Metapher</a:t>
-            </a:r>
-            <a:br>
-              <a:rPr lang="de-DE" dirty="0" smtClean="0"/>
-            </a:br>
-            <a:r>
-              <a:rPr lang="de-DE" dirty="0" smtClean="0"/>
-              <a:t/>
-            </a:r>
-            <a:br>
-              <a:rPr lang="de-DE" dirty="0" smtClean="0"/>
-            </a:br>
-            <a:r>
-              <a:rPr lang="de-DE" dirty="0" smtClean="0">
-                <a:solidFill>
-                  <a:srgbClr val="FF00FF"/>
-                </a:solidFill>
-              </a:rPr>
-              <a:t>Klare Namen</a:t>
-            </a:r>
-            <a:endParaRPr lang="en-US" dirty="0">
-              <a:solidFill>
-                <a:srgbClr val="FF00FF"/>
-              </a:solidFill>
-            </a:endParaRPr>
+              <a:t>I Do Something For You</a:t>
+            </a:r>
+            <a:endParaRPr lang="de-DE" dirty="0"/>
           </a:p>
         </p:txBody>
       </p:sp>
     </p:spTree>
+    <p:extLst>
+      <p:ext uri="{BB962C8B-B14F-4D97-AF65-F5344CB8AC3E}">
+        <p14:creationId xmlns:p14="http://schemas.microsoft.com/office/powerpoint/2010/main" val="2259103098"/>
+      </p:ext>
+    </p:extLst>
   </p:cSld>
   <p:clrMapOvr>
     <a:masterClrMapping/>
@@ -7980,228 +8178,35 @@
         </p:nvSpPr>
         <p:spPr/>
         <p:txBody>
-          <a:bodyPr>
-            <a:normAutofit/>
-          </a:bodyPr>
+          <a:bodyPr/>
           <a:lstStyle/>
           <a:p>
-            <a:pPr algn="l"/>
-            <a:r>
-              <a:rPr lang="de-AT" sz="1200" dirty="0" err="1" smtClean="0">
-                <a:latin typeface="Roboto" pitchFamily="2" charset="0"/>
-                <a:ea typeface="Roboto" pitchFamily="2" charset="0"/>
-              </a:rPr>
-              <a:t>Inspired</a:t>
-            </a:r>
-            <a:r>
-              <a:rPr lang="de-AT" sz="1200" dirty="0" smtClean="0">
-                <a:latin typeface="Roboto" pitchFamily="2" charset="0"/>
-                <a:ea typeface="Roboto" pitchFamily="2" charset="0"/>
-              </a:rPr>
-              <a:t> </a:t>
-            </a:r>
-            <a:r>
-              <a:rPr lang="de-AT" sz="1200" dirty="0" err="1" smtClean="0">
-                <a:latin typeface="Roboto" pitchFamily="2" charset="0"/>
-                <a:ea typeface="Roboto" pitchFamily="2" charset="0"/>
-              </a:rPr>
-              <a:t>by</a:t>
-            </a:r>
-            <a:r>
-              <a:rPr lang="de-AT" sz="1200" dirty="0" smtClean="0">
-                <a:latin typeface="Roboto" pitchFamily="2" charset="0"/>
-                <a:ea typeface="Roboto" pitchFamily="2" charset="0"/>
-              </a:rPr>
-              <a:t> and using the </a:t>
-            </a:r>
-            <a:r>
-              <a:rPr lang="de-AT" sz="1200" dirty="0" err="1" smtClean="0">
-                <a:latin typeface="Roboto" pitchFamily="2" charset="0"/>
-                <a:ea typeface="Roboto" pitchFamily="2" charset="0"/>
-              </a:rPr>
-              <a:t>fonts</a:t>
-            </a:r>
-            <a:r>
-              <a:rPr lang="de-AT" sz="1200" dirty="0" smtClean="0">
-                <a:latin typeface="Roboto" pitchFamily="2" charset="0"/>
-                <a:ea typeface="Roboto" pitchFamily="2" charset="0"/>
-              </a:rPr>
-              <a:t> </a:t>
-            </a:r>
-            <a:r>
-              <a:rPr lang="de-AT" sz="1200" dirty="0" err="1" smtClean="0">
-                <a:latin typeface="Roboto" pitchFamily="2" charset="0"/>
-                <a:ea typeface="Roboto" pitchFamily="2" charset="0"/>
-              </a:rPr>
-              <a:t>suggested</a:t>
-            </a:r>
-            <a:r>
-              <a:rPr lang="de-AT" sz="1200" dirty="0" smtClean="0">
-                <a:latin typeface="Roboto" pitchFamily="2" charset="0"/>
-                <a:ea typeface="Roboto" pitchFamily="2" charset="0"/>
-              </a:rPr>
-              <a:t> at</a:t>
+            <a:r>
+              <a:rPr lang="de-DE" dirty="0" smtClean="0"/>
+              <a:t>Systemische Metapher</a:t>
             </a:r>
             <a:br>
-              <a:rPr lang="de-AT" sz="1200" dirty="0" smtClean="0">
-                <a:latin typeface="Roboto" pitchFamily="2" charset="0"/>
-                <a:ea typeface="Roboto" pitchFamily="2" charset="0"/>
-              </a:rPr>
+              <a:rPr lang="de-DE" dirty="0" smtClean="0"/>
             </a:br>
             <a:r>
-              <a:rPr lang="de-AT" sz="1200" dirty="0" smtClean="0">
-                <a:latin typeface="Roboto" pitchFamily="2" charset="0"/>
-                <a:ea typeface="Roboto" pitchFamily="2" charset="0"/>
-                <a:hlinkClick r:id="rId2"/>
-              </a:rPr>
-              <a:t>http://www.labnol.org/software/tutorials/advice-select-best-fonts-for-powerpoint-presentation-slides/3355/</a:t>
-            </a:r>
-            <a:r>
-              <a:rPr lang="de-AT" sz="1200" dirty="0" smtClean="0">
-                <a:latin typeface="Roboto" pitchFamily="2" charset="0"/>
-                <a:ea typeface="Roboto" pitchFamily="2" charset="0"/>
-              </a:rPr>
+              <a:rPr lang="de-DE" dirty="0" smtClean="0"/>
               <a:t/>
             </a:r>
             <a:br>
-              <a:rPr lang="de-AT" sz="1200" dirty="0" smtClean="0">
-                <a:latin typeface="Roboto" pitchFamily="2" charset="0"/>
-                <a:ea typeface="Roboto" pitchFamily="2" charset="0"/>
-              </a:rPr>
+              <a:rPr lang="de-DE" dirty="0" smtClean="0"/>
             </a:br>
             <a:r>
-              <a:rPr lang="de-AT" sz="1200" dirty="0" smtClean="0">
-                <a:latin typeface="Roboto" pitchFamily="2" charset="0"/>
-                <a:ea typeface="Roboto" pitchFamily="2" charset="0"/>
-              </a:rPr>
-              <a:t/>
-            </a:r>
-            <a:br>
-              <a:rPr lang="de-AT" sz="1200" dirty="0" smtClean="0">
-                <a:latin typeface="Roboto" pitchFamily="2" charset="0"/>
-                <a:ea typeface="Roboto" pitchFamily="2" charset="0"/>
-              </a:rPr>
-            </a:br>
-            <a:r>
-              <a:rPr lang="de-AT" sz="1200" dirty="0" err="1" smtClean="0">
-                <a:latin typeface="Roboto" pitchFamily="2" charset="0"/>
-                <a:ea typeface="Roboto" pitchFamily="2" charset="0"/>
-              </a:rPr>
-              <a:t>Health</a:t>
-            </a:r>
-            <a:r>
-              <a:rPr lang="de-AT" sz="1200" dirty="0">
-                <a:latin typeface="Roboto" pitchFamily="2" charset="0"/>
-                <a:ea typeface="Roboto" pitchFamily="2" charset="0"/>
-              </a:rPr>
-              <a:t/>
-            </a:r>
-            <a:br>
-              <a:rPr lang="de-AT" sz="1200" dirty="0">
-                <a:latin typeface="Roboto" pitchFamily="2" charset="0"/>
-                <a:ea typeface="Roboto" pitchFamily="2" charset="0"/>
-              </a:rPr>
-            </a:br>
-            <a:r>
-              <a:rPr lang="de-DE" sz="1200" dirty="0">
-                <a:latin typeface="Roboto" pitchFamily="2" charset="0"/>
-                <a:ea typeface="Roboto" pitchFamily="2" charset="0"/>
-                <a:hlinkClick r:id="rId3"/>
-              </a:rPr>
-              <a:t>http://thenounproject.com/noun/first-aid/#</a:t>
-            </a:r>
-            <a:r>
-              <a:rPr lang="de-DE" sz="1200" dirty="0" smtClean="0">
-                <a:latin typeface="Roboto" pitchFamily="2" charset="0"/>
-                <a:ea typeface="Roboto" pitchFamily="2" charset="0"/>
-                <a:hlinkClick r:id="rId3"/>
-              </a:rPr>
-              <a:t>icon-No2208</a:t>
-            </a:r>
-            <a:r>
-              <a:rPr lang="de-DE" sz="1200" dirty="0" smtClean="0">
-                <a:latin typeface="Roboto" pitchFamily="2" charset="0"/>
-                <a:ea typeface="Roboto" pitchFamily="2" charset="0"/>
-              </a:rPr>
-              <a:t/>
-            </a:r>
-            <a:br>
-              <a:rPr lang="de-DE" sz="1200" dirty="0" smtClean="0">
-                <a:latin typeface="Roboto" pitchFamily="2" charset="0"/>
-                <a:ea typeface="Roboto" pitchFamily="2" charset="0"/>
-              </a:rPr>
-            </a:br>
-            <a:r>
-              <a:rPr lang="de-DE" sz="1200" dirty="0" smtClean="0">
-                <a:latin typeface="Roboto" pitchFamily="2" charset="0"/>
-                <a:ea typeface="Roboto" pitchFamily="2" charset="0"/>
-              </a:rPr>
-              <a:t/>
-            </a:r>
-            <a:br>
-              <a:rPr lang="de-DE" sz="1200" dirty="0" smtClean="0">
-                <a:latin typeface="Roboto" pitchFamily="2" charset="0"/>
-                <a:ea typeface="Roboto" pitchFamily="2" charset="0"/>
-              </a:rPr>
-            </a:br>
-            <a:r>
-              <a:rPr lang="de-DE" sz="1200" dirty="0">
-                <a:latin typeface="Roboto" pitchFamily="2" charset="0"/>
-                <a:ea typeface="Roboto" pitchFamily="2" charset="0"/>
-              </a:rPr>
-              <a:t/>
-            </a:r>
-            <a:br>
-              <a:rPr lang="de-DE" sz="1200" dirty="0">
-                <a:latin typeface="Roboto" pitchFamily="2" charset="0"/>
-                <a:ea typeface="Roboto" pitchFamily="2" charset="0"/>
-              </a:rPr>
-            </a:br>
-            <a:r>
-              <a:rPr lang="de-DE" sz="1200" dirty="0">
-                <a:latin typeface="Roboto" pitchFamily="2" charset="0"/>
-                <a:ea typeface="Roboto" pitchFamily="2" charset="0"/>
-              </a:rPr>
-              <a:t/>
-            </a:r>
-            <a:br>
-              <a:rPr lang="de-DE" sz="1200" dirty="0">
-                <a:latin typeface="Roboto" pitchFamily="2" charset="0"/>
-                <a:ea typeface="Roboto" pitchFamily="2" charset="0"/>
-              </a:rPr>
-            </a:br>
-            <a:r>
-              <a:rPr lang="de-DE" sz="1200" dirty="0" smtClean="0">
-                <a:latin typeface="Roboto" pitchFamily="2" charset="0"/>
-                <a:ea typeface="Roboto" pitchFamily="2" charset="0"/>
-              </a:rPr>
-              <a:t>Andy Palmer on Singletons</a:t>
-            </a:r>
-            <a:br>
-              <a:rPr lang="de-DE" sz="1200" dirty="0" smtClean="0">
-                <a:latin typeface="Roboto" pitchFamily="2" charset="0"/>
-                <a:ea typeface="Roboto" pitchFamily="2" charset="0"/>
-              </a:rPr>
-            </a:br>
-            <a:r>
-              <a:rPr lang="de-DE" sz="1200" dirty="0" smtClean="0">
-                <a:latin typeface="Roboto" pitchFamily="2" charset="0"/>
-                <a:ea typeface="Roboto" pitchFamily="2" charset="0"/>
-                <a:hlinkClick r:id="rId4"/>
-              </a:rPr>
-              <a:t>http</a:t>
-            </a:r>
-            <a:r>
-              <a:rPr lang="de-DE" sz="1200" dirty="0">
-                <a:latin typeface="Roboto" pitchFamily="2" charset="0"/>
-                <a:ea typeface="Roboto" pitchFamily="2" charset="0"/>
-                <a:hlinkClick r:id="rId4"/>
-              </a:rPr>
-              <a:t>://andypalmer.com/2008/05/singletons/</a:t>
-            </a:r>
-            <a:endParaRPr lang="en-US" sz="1200" dirty="0">
-              <a:latin typeface="Roboto" pitchFamily="2" charset="0"/>
-              <a:ea typeface="Roboto" pitchFamily="2" charset="0"/>
+              <a:rPr lang="de-DE" dirty="0" smtClean="0">
+                <a:solidFill>
+                  <a:srgbClr val="FF00FF"/>
+                </a:solidFill>
+              </a:rPr>
+              <a:t>Klare Namen</a:t>
+            </a:r>
+            <a:endParaRPr lang="en-US" dirty="0">
+              <a:solidFill>
+                <a:srgbClr val="FF00FF"/>
+              </a:solidFill>
             </a:endParaRPr>
           </a:p>
         </p:txBody>
@@ -8222,6 +8227,276 @@
 </file>
 
 <file path=ppt/slides/slide123.xml><?xml version="1.0" encoding="utf-8"?>
+<p:sld xmlns:a="http://schemas.openxmlformats.org/drawingml/2006/main" xmlns:r="http://schemas.openxmlformats.org/officeDocument/2006/relationships" xmlns:p="http://schemas.openxmlformats.org/presentationml/2006/main">
+  <p:cSld>
+    <p:spTree>
+      <p:nvGrpSpPr>
+        <p:cNvPr id="1" name=""/>
+        <p:cNvGrpSpPr/>
+        <p:nvPr/>
+      </p:nvGrpSpPr>
+      <p:grpSpPr>
+        <a:xfrm>
+          <a:off x="0" y="0"/>
+          <a:ext cx="0" cy="0"/>
+          <a:chOff x="0" y="0"/>
+          <a:chExt cx="0" cy="0"/>
+        </a:xfrm>
+      </p:grpSpPr>
+      <p:sp>
+        <p:nvSpPr>
+          <p:cNvPr id="2" name="Titel 1"/>
+          <p:cNvSpPr>
+            <a:spLocks noGrp="1"/>
+          </p:cNvSpPr>
+          <p:nvPr>
+            <p:ph type="title"/>
+          </p:nvPr>
+        </p:nvSpPr>
+        <p:spPr/>
+        <p:txBody>
+          <a:bodyPr>
+            <a:normAutofit/>
+          </a:bodyPr>
+          <a:lstStyle/>
+          <a:p>
+            <a:pPr algn="l"/>
+            <a:r>
+              <a:rPr lang="de-AT" sz="1200" dirty="0" err="1" smtClean="0">
+                <a:latin typeface="Roboto" pitchFamily="2" charset="0"/>
+                <a:ea typeface="Roboto" pitchFamily="2" charset="0"/>
+              </a:rPr>
+              <a:t>Inspired</a:t>
+            </a:r>
+            <a:r>
+              <a:rPr lang="de-AT" sz="1200" dirty="0" smtClean="0">
+                <a:latin typeface="Roboto" pitchFamily="2" charset="0"/>
+                <a:ea typeface="Roboto" pitchFamily="2" charset="0"/>
+              </a:rPr>
+              <a:t> </a:t>
+            </a:r>
+            <a:r>
+              <a:rPr lang="de-AT" sz="1200" dirty="0" err="1" smtClean="0">
+                <a:latin typeface="Roboto" pitchFamily="2" charset="0"/>
+                <a:ea typeface="Roboto" pitchFamily="2" charset="0"/>
+              </a:rPr>
+              <a:t>by</a:t>
+            </a:r>
+            <a:r>
+              <a:rPr lang="de-AT" sz="1200" dirty="0" smtClean="0">
+                <a:latin typeface="Roboto" pitchFamily="2" charset="0"/>
+                <a:ea typeface="Roboto" pitchFamily="2" charset="0"/>
+              </a:rPr>
+              <a:t> and using the </a:t>
+            </a:r>
+            <a:r>
+              <a:rPr lang="de-AT" sz="1200" dirty="0" err="1" smtClean="0">
+                <a:latin typeface="Roboto" pitchFamily="2" charset="0"/>
+                <a:ea typeface="Roboto" pitchFamily="2" charset="0"/>
+              </a:rPr>
+              <a:t>fonts</a:t>
+            </a:r>
+            <a:r>
+              <a:rPr lang="de-AT" sz="1200" dirty="0" smtClean="0">
+                <a:latin typeface="Roboto" pitchFamily="2" charset="0"/>
+                <a:ea typeface="Roboto" pitchFamily="2" charset="0"/>
+              </a:rPr>
+              <a:t> </a:t>
+            </a:r>
+            <a:r>
+              <a:rPr lang="de-AT" sz="1200" dirty="0" err="1" smtClean="0">
+                <a:latin typeface="Roboto" pitchFamily="2" charset="0"/>
+                <a:ea typeface="Roboto" pitchFamily="2" charset="0"/>
+              </a:rPr>
+              <a:t>suggested</a:t>
+            </a:r>
+            <a:r>
+              <a:rPr lang="de-AT" sz="1200" dirty="0" smtClean="0">
+                <a:latin typeface="Roboto" pitchFamily="2" charset="0"/>
+                <a:ea typeface="Roboto" pitchFamily="2" charset="0"/>
+              </a:rPr>
+              <a:t> at</a:t>
+            </a:r>
+            <a:br>
+              <a:rPr lang="de-AT" sz="1200" dirty="0" smtClean="0">
+                <a:latin typeface="Roboto" pitchFamily="2" charset="0"/>
+                <a:ea typeface="Roboto" pitchFamily="2" charset="0"/>
+              </a:rPr>
+            </a:br>
+            <a:r>
+              <a:rPr lang="de-AT" sz="1200" dirty="0" smtClean="0">
+                <a:latin typeface="Roboto" pitchFamily="2" charset="0"/>
+                <a:ea typeface="Roboto" pitchFamily="2" charset="0"/>
+                <a:hlinkClick r:id="rId2"/>
+              </a:rPr>
+              <a:t>http://www.labnol.org/software/tutorials/advice-select-best-fonts-for-powerpoint-presentation-slides/3355/</a:t>
+            </a:r>
+            <a:r>
+              <a:rPr lang="de-AT" sz="1200" dirty="0" smtClean="0">
+                <a:latin typeface="Roboto" pitchFamily="2" charset="0"/>
+                <a:ea typeface="Roboto" pitchFamily="2" charset="0"/>
+              </a:rPr>
+              <a:t/>
+            </a:r>
+            <a:br>
+              <a:rPr lang="de-AT" sz="1200" dirty="0" smtClean="0">
+                <a:latin typeface="Roboto" pitchFamily="2" charset="0"/>
+                <a:ea typeface="Roboto" pitchFamily="2" charset="0"/>
+              </a:rPr>
+            </a:br>
+            <a:r>
+              <a:rPr lang="de-AT" sz="1200" dirty="0" smtClean="0">
+                <a:latin typeface="Roboto" pitchFamily="2" charset="0"/>
+                <a:ea typeface="Roboto" pitchFamily="2" charset="0"/>
+              </a:rPr>
+              <a:t/>
+            </a:r>
+            <a:br>
+              <a:rPr lang="de-AT" sz="1200" dirty="0" smtClean="0">
+                <a:latin typeface="Roboto" pitchFamily="2" charset="0"/>
+                <a:ea typeface="Roboto" pitchFamily="2" charset="0"/>
+              </a:rPr>
+            </a:br>
+            <a:r>
+              <a:rPr lang="de-AT" sz="1200" dirty="0" err="1" smtClean="0">
+                <a:latin typeface="Roboto" pitchFamily="2" charset="0"/>
+                <a:ea typeface="Roboto" pitchFamily="2" charset="0"/>
+              </a:rPr>
+              <a:t>Health</a:t>
+            </a:r>
+            <a:r>
+              <a:rPr lang="de-AT" sz="1200" dirty="0">
+                <a:latin typeface="Roboto" pitchFamily="2" charset="0"/>
+                <a:ea typeface="Roboto" pitchFamily="2" charset="0"/>
+              </a:rPr>
+              <a:t/>
+            </a:r>
+            <a:br>
+              <a:rPr lang="de-AT" sz="1200" dirty="0">
+                <a:latin typeface="Roboto" pitchFamily="2" charset="0"/>
+                <a:ea typeface="Roboto" pitchFamily="2" charset="0"/>
+              </a:rPr>
+            </a:br>
+            <a:r>
+              <a:rPr lang="de-DE" sz="1200" dirty="0">
+                <a:latin typeface="Roboto" pitchFamily="2" charset="0"/>
+                <a:ea typeface="Roboto" pitchFamily="2" charset="0"/>
+                <a:hlinkClick r:id="rId3"/>
+              </a:rPr>
+              <a:t>http://thenounproject.com/noun/first-aid/#</a:t>
+            </a:r>
+            <a:r>
+              <a:rPr lang="de-DE" sz="1200" dirty="0" smtClean="0">
+                <a:latin typeface="Roboto" pitchFamily="2" charset="0"/>
+                <a:ea typeface="Roboto" pitchFamily="2" charset="0"/>
+                <a:hlinkClick r:id="rId3"/>
+              </a:rPr>
+              <a:t>icon-No2208</a:t>
+            </a:r>
+            <a:r>
+              <a:rPr lang="de-DE" sz="1200" dirty="0" smtClean="0">
+                <a:latin typeface="Roboto" pitchFamily="2" charset="0"/>
+                <a:ea typeface="Roboto" pitchFamily="2" charset="0"/>
+              </a:rPr>
+              <a:t/>
+            </a:r>
+            <a:br>
+              <a:rPr lang="de-DE" sz="1200" dirty="0" smtClean="0">
+                <a:latin typeface="Roboto" pitchFamily="2" charset="0"/>
+                <a:ea typeface="Roboto" pitchFamily="2" charset="0"/>
+              </a:rPr>
+            </a:br>
+            <a:r>
+              <a:rPr lang="de-DE" sz="1200" dirty="0" smtClean="0">
+                <a:latin typeface="Roboto" pitchFamily="2" charset="0"/>
+                <a:ea typeface="Roboto" pitchFamily="2" charset="0"/>
+              </a:rPr>
+              <a:t/>
+            </a:r>
+            <a:br>
+              <a:rPr lang="de-DE" sz="1200" dirty="0" smtClean="0">
+                <a:latin typeface="Roboto" pitchFamily="2" charset="0"/>
+                <a:ea typeface="Roboto" pitchFamily="2" charset="0"/>
+              </a:rPr>
+            </a:br>
+            <a:r>
+              <a:rPr lang="de-DE" sz="1200" dirty="0">
+                <a:latin typeface="Roboto" pitchFamily="2" charset="0"/>
+                <a:ea typeface="Roboto" pitchFamily="2" charset="0"/>
+              </a:rPr>
+              <a:t/>
+            </a:r>
+            <a:br>
+              <a:rPr lang="de-DE" sz="1200" dirty="0">
+                <a:latin typeface="Roboto" pitchFamily="2" charset="0"/>
+                <a:ea typeface="Roboto" pitchFamily="2" charset="0"/>
+              </a:rPr>
+            </a:br>
+            <a:r>
+              <a:rPr lang="de-DE" sz="1200" dirty="0">
+                <a:latin typeface="Roboto" pitchFamily="2" charset="0"/>
+                <a:ea typeface="Roboto" pitchFamily="2" charset="0"/>
+              </a:rPr>
+              <a:t/>
+            </a:r>
+            <a:br>
+              <a:rPr lang="de-DE" sz="1200" dirty="0">
+                <a:latin typeface="Roboto" pitchFamily="2" charset="0"/>
+                <a:ea typeface="Roboto" pitchFamily="2" charset="0"/>
+              </a:rPr>
+            </a:br>
+            <a:r>
+              <a:rPr lang="de-DE" sz="1200" dirty="0" smtClean="0">
+                <a:latin typeface="Roboto" pitchFamily="2" charset="0"/>
+                <a:ea typeface="Roboto" pitchFamily="2" charset="0"/>
+              </a:rPr>
+              <a:t>Andy Palmer on Singletons</a:t>
+            </a:r>
+            <a:br>
+              <a:rPr lang="de-DE" sz="1200" dirty="0" smtClean="0">
+                <a:latin typeface="Roboto" pitchFamily="2" charset="0"/>
+                <a:ea typeface="Roboto" pitchFamily="2" charset="0"/>
+              </a:rPr>
+            </a:br>
+            <a:r>
+              <a:rPr lang="de-DE" sz="1200" dirty="0" smtClean="0">
+                <a:latin typeface="Roboto" pitchFamily="2" charset="0"/>
+                <a:ea typeface="Roboto" pitchFamily="2" charset="0"/>
+                <a:hlinkClick r:id="rId4"/>
+              </a:rPr>
+              <a:t>http</a:t>
+            </a:r>
+            <a:r>
+              <a:rPr lang="de-DE" sz="1200" dirty="0">
+                <a:latin typeface="Roboto" pitchFamily="2" charset="0"/>
+                <a:ea typeface="Roboto" pitchFamily="2" charset="0"/>
+                <a:hlinkClick r:id="rId4"/>
+              </a:rPr>
+              <a:t>://andypalmer.com/2008/05/singletons/</a:t>
+            </a:r>
+            <a:endParaRPr lang="en-US" sz="1200" dirty="0">
+              <a:latin typeface="Roboto" pitchFamily="2" charset="0"/>
+              <a:ea typeface="Roboto" pitchFamily="2" charset="0"/>
+            </a:endParaRPr>
+          </a:p>
+        </p:txBody>
+      </p:sp>
+    </p:spTree>
+  </p:cSld>
+  <p:clrMapOvr>
+    <a:masterClrMapping/>
+  </p:clrMapOvr>
+  <p:timing>
+    <p:tnLst>
+      <p:par>
+        <p:cTn id="1" dur="indefinite" restart="never" nodeType="tmRoot"/>
+      </p:par>
+    </p:tnLst>
+  </p:timing>
+</p:sld>
+</file>
+
+<file path=ppt/slides/slide124.xml><?xml version="1.0" encoding="utf-8"?>
 <p:sld xmlns:a="http://schemas.openxmlformats.org/drawingml/2006/main" xmlns:r="http://schemas.openxmlformats.org/officeDocument/2006/relationships" xmlns:p="http://schemas.openxmlformats.org/presentationml/2006/main">
   <p:cSld>
     <p:spTree>
@@ -21515,18 +21790,7 @@
                 <a:ea typeface="Roboto" pitchFamily="2" charset="0"/>
                 <a:cs typeface="Consolas" pitchFamily="49" charset="0"/>
               </a:rPr>
-              <a:t> </a:t>
-            </a:r>
-            <a:r>
-              <a:rPr lang="en-US" sz="2000" b="1" dirty="0" smtClean="0">
-                <a:solidFill>
-                  <a:schemeClr val="bg1"/>
-                </a:solidFill>
-                <a:latin typeface="Consolas" pitchFamily="49" charset="0"/>
-                <a:ea typeface="Roboto" pitchFamily="2" charset="0"/>
-                <a:cs typeface="Consolas" pitchFamily="49" charset="0"/>
-              </a:rPr>
-              <a:t>instance </a:t>
+              <a:t> instance </a:t>
             </a:r>
             <a:r>
               <a:rPr lang="en-US" sz="2000" b="1" dirty="0">
@@ -22289,14 +22553,6 @@
               </a:rPr>
               <a:t>&gt;();</a:t>
             </a:r>
-            <a:endParaRPr lang="en-US" sz="2000" b="1" dirty="0" smtClean="0">
-              <a:solidFill>
-                <a:schemeClr val="bg1"/>
-              </a:solidFill>
-              <a:latin typeface="Consolas" pitchFamily="49" charset="0"/>
-              <a:ea typeface="Roboto" pitchFamily="2" charset="0"/>
-              <a:cs typeface="Consolas" pitchFamily="49" charset="0"/>
-            </a:endParaRPr>
           </a:p>
         </p:txBody>
       </p:sp>
@@ -22481,14 +22737,6 @@
               </a:rPr>
               <a:t>&gt;();</a:t>
             </a:r>
-            <a:endParaRPr lang="en-US" sz="2000" b="1" dirty="0" smtClean="0">
-              <a:solidFill>
-                <a:schemeClr val="bg1"/>
-              </a:solidFill>
-              <a:latin typeface="Consolas" pitchFamily="49" charset="0"/>
-              <a:ea typeface="Roboto" pitchFamily="2" charset="0"/>
-              <a:cs typeface="Consolas" pitchFamily="49" charset="0"/>
-            </a:endParaRPr>
           </a:p>
         </p:txBody>
       </p:sp>
@@ -22670,14 +22918,6 @@
               </a:rPr>
               <a:t>&gt;();</a:t>
             </a:r>
-            <a:endParaRPr lang="en-US" sz="2000" b="1" dirty="0" smtClean="0">
-              <a:solidFill>
-                <a:schemeClr val="bg1"/>
-              </a:solidFill>
-              <a:latin typeface="Consolas" pitchFamily="49" charset="0"/>
-              <a:ea typeface="Roboto" pitchFamily="2" charset="0"/>
-              <a:cs typeface="Consolas" pitchFamily="49" charset="0"/>
-            </a:endParaRPr>
           </a:p>
         </p:txBody>
       </p:sp>
@@ -22843,14 +23083,6 @@
               </a:rPr>
               <a:t>&gt;();</a:t>
             </a:r>
-            <a:endParaRPr lang="en-US" sz="2000" b="1" dirty="0" smtClean="0">
-              <a:solidFill>
-                <a:schemeClr val="bg1"/>
-              </a:solidFill>
-              <a:latin typeface="Consolas" pitchFamily="49" charset="0"/>
-              <a:ea typeface="Roboto" pitchFamily="2" charset="0"/>
-              <a:cs typeface="Consolas" pitchFamily="49" charset="0"/>
-            </a:endParaRPr>
           </a:p>
         </p:txBody>
       </p:sp>

</xml_diff>

<commit_message>
Renamed martin golding to john woods - was misquoted
</commit_message>
<xml_diff>
--- a/WeaselWords-DotnetDevCon.pptx
+++ b/WeaselWords-DotnetDevCon.pptx
@@ -316,7 +316,7 @@
             <a:fld id="{387BDB18-914D-4BFD-8CA5-9EA31C659A99}" type="datetimeFigureOut">
               <a:rPr lang="en-US" smtClean="0"/>
               <a:pPr/>
-              <a:t>5/15/2012</a:t>
+              <a:t>8/29/2012</a:t>
             </a:fld>
             <a:endParaRPr lang="en-US"/>
           </a:p>
@@ -984,7 +984,7 @@
             <a:fld id="{1BA50D42-C9CD-4801-B293-61D1F53EC57E}" type="datetimeFigureOut">
               <a:rPr lang="de-DE" smtClean="0"/>
               <a:pPr/>
-              <a:t>15.05.2012</a:t>
+              <a:t>29.08.2012</a:t>
             </a:fld>
             <a:endParaRPr lang="de-DE"/>
           </a:p>
@@ -1188,7 +1188,7 @@
             <a:fld id="{1BA50D42-C9CD-4801-B293-61D1F53EC57E}" type="datetimeFigureOut">
               <a:rPr lang="de-DE" smtClean="0"/>
               <a:pPr/>
-              <a:t>15.05.2012</a:t>
+              <a:t>29.08.2012</a:t>
             </a:fld>
             <a:endParaRPr lang="de-DE"/>
           </a:p>
@@ -1400,7 +1400,7 @@
             <a:fld id="{49009F1C-25D2-4D02-B5E1-1CF1D044B88A}" type="datetime1">
               <a:rPr lang="de-DE" smtClean="0"/>
               <a:pPr/>
-              <a:t>15.05.2012</a:t>
+              <a:t>29.08.2012</a:t>
             </a:fld>
             <a:endParaRPr lang="de-DE"/>
           </a:p>
@@ -1736,7 +1736,7 @@
             <a:fld id="{1BA50D42-C9CD-4801-B293-61D1F53EC57E}" type="datetimeFigureOut">
               <a:rPr lang="de-DE" smtClean="0"/>
               <a:pPr/>
-              <a:t>15.05.2012</a:t>
+              <a:t>29.08.2012</a:t>
             </a:fld>
             <a:endParaRPr lang="de-DE"/>
           </a:p>
@@ -2051,7 +2051,7 @@
             <a:fld id="{1BA50D42-C9CD-4801-B293-61D1F53EC57E}" type="datetimeFigureOut">
               <a:rPr lang="de-DE" smtClean="0"/>
               <a:pPr/>
-              <a:t>15.05.2012</a:t>
+              <a:t>29.08.2012</a:t>
             </a:fld>
             <a:endParaRPr lang="de-DE"/>
           </a:p>
@@ -2506,7 +2506,7 @@
             <a:fld id="{1BA50D42-C9CD-4801-B293-61D1F53EC57E}" type="datetimeFigureOut">
               <a:rPr lang="de-DE" smtClean="0"/>
               <a:pPr/>
-              <a:t>15.05.2012</a:t>
+              <a:t>29.08.2012</a:t>
             </a:fld>
             <a:endParaRPr lang="de-DE"/>
           </a:p>
@@ -2645,7 +2645,7 @@
             <a:fld id="{1BA50D42-C9CD-4801-B293-61D1F53EC57E}" type="datetimeFigureOut">
               <a:rPr lang="de-DE" smtClean="0"/>
               <a:pPr/>
-              <a:t>15.05.2012</a:t>
+              <a:t>29.08.2012</a:t>
             </a:fld>
             <a:endParaRPr lang="de-DE"/>
           </a:p>
@@ -2761,7 +2761,7 @@
             <a:fld id="{1BA50D42-C9CD-4801-B293-61D1F53EC57E}" type="datetimeFigureOut">
               <a:rPr lang="de-DE" smtClean="0"/>
               <a:pPr/>
-              <a:t>15.05.2012</a:t>
+              <a:t>29.08.2012</a:t>
             </a:fld>
             <a:endParaRPr lang="de-DE"/>
           </a:p>
@@ -3065,7 +3065,7 @@
             <a:fld id="{1BA50D42-C9CD-4801-B293-61D1F53EC57E}" type="datetimeFigureOut">
               <a:rPr lang="de-DE" smtClean="0"/>
               <a:pPr/>
-              <a:t>15.05.2012</a:t>
+              <a:t>29.08.2012</a:t>
             </a:fld>
             <a:endParaRPr lang="de-DE"/>
           </a:p>
@@ -3345,7 +3345,7 @@
             <a:fld id="{1BA50D42-C9CD-4801-B293-61D1F53EC57E}" type="datetimeFigureOut">
               <a:rPr lang="de-DE" smtClean="0"/>
               <a:pPr/>
-              <a:t>15.05.2012</a:t>
+              <a:t>29.08.2012</a:t>
             </a:fld>
             <a:endParaRPr lang="de-DE"/>
           </a:p>
@@ -3834,7 +3834,7 @@
           <a:p>
             <a:pPr algn="r"/>
             <a:r>
-              <a:rPr lang="en-US" sz="4400" dirty="0" smtClean="0">
+              <a:rPr lang="en-US" sz="4400" smtClean="0">
                 <a:solidFill>
                   <a:schemeClr val="tx1">
                     <a:lumMod val="75000"/>
@@ -3843,19 +3843,7 @@
                 </a:solidFill>
                 <a:ea typeface="Roboto" pitchFamily="2" charset="0"/>
               </a:rPr>
-              <a:t> Martin Golding</a:t>
-            </a:r>
-            <a:r>
-              <a:rPr lang="en-US" sz="2800" dirty="0" smtClean="0">
-                <a:solidFill>
-                  <a:schemeClr val="tx1">
-                    <a:lumMod val="75000"/>
-                    <a:lumOff val="25000"/>
-                  </a:schemeClr>
-                </a:solidFill>
-                <a:ea typeface="Roboto" pitchFamily="2" charset="0"/>
-              </a:rPr>
-              <a:t>.</a:t>
+              <a:t>John Woods.</a:t>
             </a:r>
             <a:endParaRPr lang="en-US" sz="2800" dirty="0">
               <a:solidFill>
@@ -7554,16 +7542,7 @@
                 </a:solidFill>
                 <a:latin typeface="Consolas"/>
               </a:rPr>
-              <a:t>  </a:t>
-            </a:r>
-            <a:r>
-              <a:rPr lang="en-US" sz="2000" b="1" dirty="0" smtClean="0">
-                <a:solidFill>
-                  <a:schemeClr val="bg1"/>
-                </a:solidFill>
-                <a:latin typeface="Consolas"/>
-              </a:rPr>
-              <a:t>}</a:t>
+              <a:t>  }</a:t>
             </a:r>
             <a:endParaRPr lang="en-US" sz="2000" b="1" dirty="0">
               <a:solidFill>

</xml_diff>

<commit_message>
Changed something - forgot what that was. Dont do that.
</commit_message>
<xml_diff>
--- a/WeaselWords-DotnetDevCon.pptx
+++ b/WeaselWords-DotnetDevCon.pptx
@@ -340,7 +340,7 @@
             <a:fld id="{387BDB18-914D-4BFD-8CA5-9EA31C659A99}" type="datetimeFigureOut">
               <a:rPr lang="en-US" smtClean="0"/>
               <a:pPr/>
-              <a:t>11/17/2012</a:t>
+              <a:t>11/21/2012</a:t>
             </a:fld>
             <a:endParaRPr lang="en-US"/>
           </a:p>
@@ -511,7 +511,7 @@
     </p:spTree>
     <p:extLst>
       <p:ext uri="{BB962C8B-B14F-4D97-AF65-F5344CB8AC3E}">
-        <p14:creationId xmlns="" xmlns:p14="http://schemas.microsoft.com/office/powerpoint/2010/main" val="3673850454"/>
+        <p14:creationId xmlns:p14="http://schemas.microsoft.com/office/powerpoint/2010/main" val="3673850454"/>
       </p:ext>
     </p:extLst>
   </p:cSld>
@@ -902,7 +902,7 @@
     </p:spTree>
     <p:extLst>
       <p:ext uri="{BB962C8B-B14F-4D97-AF65-F5344CB8AC3E}">
-        <p14:creationId xmlns="" xmlns:p14="http://schemas.microsoft.com/office/powerpoint/2010/main" val="1932979210"/>
+        <p14:creationId xmlns:p14="http://schemas.microsoft.com/office/powerpoint/2010/main" val="1932979210"/>
       </p:ext>
     </p:extLst>
   </p:cSld>
@@ -1200,7 +1200,7 @@
             <a:fld id="{1BA50D42-C9CD-4801-B293-61D1F53EC57E}" type="datetimeFigureOut">
               <a:rPr lang="de-DE" smtClean="0"/>
               <a:pPr/>
-              <a:t>17.11.2012</a:t>
+              <a:t>21.11.2012</a:t>
             </a:fld>
             <a:endParaRPr lang="de-DE"/>
           </a:p>
@@ -1404,7 +1404,7 @@
             <a:fld id="{1BA50D42-C9CD-4801-B293-61D1F53EC57E}" type="datetimeFigureOut">
               <a:rPr lang="de-DE" smtClean="0"/>
               <a:pPr/>
-              <a:t>17.11.2012</a:t>
+              <a:t>21.11.2012</a:t>
             </a:fld>
             <a:endParaRPr lang="de-DE"/>
           </a:p>
@@ -1616,7 +1616,7 @@
             <a:fld id="{49009F1C-25D2-4D02-B5E1-1CF1D044B88A}" type="datetime1">
               <a:rPr lang="de-DE" smtClean="0"/>
               <a:pPr/>
-              <a:t>17.11.2012</a:t>
+              <a:t>21.11.2012</a:t>
             </a:fld>
             <a:endParaRPr lang="de-DE"/>
           </a:p>
@@ -1684,7 +1684,7 @@
     </p:spTree>
     <p:extLst>
       <p:ext uri="{BB962C8B-B14F-4D97-AF65-F5344CB8AC3E}">
-        <p14:creationId xmlns="" xmlns:p14="http://schemas.microsoft.com/office/powerpoint/2010/main" val="3524703957"/>
+        <p14:creationId xmlns:p14="http://schemas.microsoft.com/office/powerpoint/2010/main" val="3524703957"/>
       </p:ext>
     </p:extLst>
   </p:cSld>
@@ -1952,7 +1952,7 @@
             <a:fld id="{1BA50D42-C9CD-4801-B293-61D1F53EC57E}" type="datetimeFigureOut">
               <a:rPr lang="de-DE" smtClean="0"/>
               <a:pPr/>
-              <a:t>17.11.2012</a:t>
+              <a:t>21.11.2012</a:t>
             </a:fld>
             <a:endParaRPr lang="de-DE"/>
           </a:p>
@@ -2267,7 +2267,7 @@
             <a:fld id="{1BA50D42-C9CD-4801-B293-61D1F53EC57E}" type="datetimeFigureOut">
               <a:rPr lang="de-DE" smtClean="0"/>
               <a:pPr/>
-              <a:t>17.11.2012</a:t>
+              <a:t>21.11.2012</a:t>
             </a:fld>
             <a:endParaRPr lang="de-DE"/>
           </a:p>
@@ -2722,7 +2722,7 @@
             <a:fld id="{1BA50D42-C9CD-4801-B293-61D1F53EC57E}" type="datetimeFigureOut">
               <a:rPr lang="de-DE" smtClean="0"/>
               <a:pPr/>
-              <a:t>17.11.2012</a:t>
+              <a:t>21.11.2012</a:t>
             </a:fld>
             <a:endParaRPr lang="de-DE"/>
           </a:p>
@@ -2861,7 +2861,7 @@
             <a:fld id="{1BA50D42-C9CD-4801-B293-61D1F53EC57E}" type="datetimeFigureOut">
               <a:rPr lang="de-DE" smtClean="0"/>
               <a:pPr/>
-              <a:t>17.11.2012</a:t>
+              <a:t>21.11.2012</a:t>
             </a:fld>
             <a:endParaRPr lang="de-DE"/>
           </a:p>
@@ -2977,7 +2977,7 @@
             <a:fld id="{1BA50D42-C9CD-4801-B293-61D1F53EC57E}" type="datetimeFigureOut">
               <a:rPr lang="de-DE" smtClean="0"/>
               <a:pPr/>
-              <a:t>17.11.2012</a:t>
+              <a:t>21.11.2012</a:t>
             </a:fld>
             <a:endParaRPr lang="de-DE"/>
           </a:p>
@@ -3281,7 +3281,7 @@
             <a:fld id="{1BA50D42-C9CD-4801-B293-61D1F53EC57E}" type="datetimeFigureOut">
               <a:rPr lang="de-DE" smtClean="0"/>
               <a:pPr/>
-              <a:t>17.11.2012</a:t>
+              <a:t>21.11.2012</a:t>
             </a:fld>
             <a:endParaRPr lang="de-DE"/>
           </a:p>
@@ -3561,7 +3561,7 @@
             <a:fld id="{1BA50D42-C9CD-4801-B293-61D1F53EC57E}" type="datetimeFigureOut">
               <a:rPr lang="de-DE" smtClean="0"/>
               <a:pPr/>
-              <a:t>17.11.2012</a:t>
+              <a:t>21.11.2012</a:t>
             </a:fld>
             <a:endParaRPr lang="de-DE"/>
           </a:p>
@@ -4381,7 +4381,7 @@
     </p:spTree>
     <p:extLst>
       <p:ext uri="{BB962C8B-B14F-4D97-AF65-F5344CB8AC3E}">
-        <p14:creationId xmlns="" xmlns:p14="http://schemas.microsoft.com/office/powerpoint/2010/main" val="1103238575"/>
+        <p14:creationId xmlns:p14="http://schemas.microsoft.com/office/powerpoint/2010/main" val="1103238575"/>
       </p:ext>
     </p:extLst>
   </p:cSld>
@@ -4453,7 +4453,7 @@
     </p:spTree>
     <p:extLst>
       <p:ext uri="{BB962C8B-B14F-4D97-AF65-F5344CB8AC3E}">
-        <p14:creationId xmlns="" xmlns:p14="http://schemas.microsoft.com/office/powerpoint/2010/main" val="655278351"/>
+        <p14:creationId xmlns:p14="http://schemas.microsoft.com/office/powerpoint/2010/main" val="655278351"/>
       </p:ext>
     </p:extLst>
   </p:cSld>
@@ -4531,7 +4531,7 @@
     </p:spTree>
     <p:extLst>
       <p:ext uri="{BB962C8B-B14F-4D97-AF65-F5344CB8AC3E}">
-        <p14:creationId xmlns="" xmlns:p14="http://schemas.microsoft.com/office/powerpoint/2010/main" val="3777989840"/>
+        <p14:creationId xmlns:p14="http://schemas.microsoft.com/office/powerpoint/2010/main" val="3777989840"/>
       </p:ext>
     </p:extLst>
   </p:cSld>
@@ -4613,7 +4613,7 @@
     </p:spTree>
     <p:extLst>
       <p:ext uri="{BB962C8B-B14F-4D97-AF65-F5344CB8AC3E}">
-        <p14:creationId xmlns="" xmlns:p14="http://schemas.microsoft.com/office/powerpoint/2010/main" val="1212602323"/>
+        <p14:creationId xmlns:p14="http://schemas.microsoft.com/office/powerpoint/2010/main" val="1212602323"/>
       </p:ext>
     </p:extLst>
   </p:cSld>
@@ -4695,7 +4695,7 @@
     </p:spTree>
     <p:extLst>
       <p:ext uri="{BB962C8B-B14F-4D97-AF65-F5344CB8AC3E}">
-        <p14:creationId xmlns="" xmlns:p14="http://schemas.microsoft.com/office/powerpoint/2010/main" val="1862508108"/>
+        <p14:creationId xmlns:p14="http://schemas.microsoft.com/office/powerpoint/2010/main" val="1862508108"/>
       </p:ext>
     </p:extLst>
   </p:cSld>
@@ -4762,7 +4762,7 @@
     </p:spTree>
     <p:extLst>
       <p:ext uri="{BB962C8B-B14F-4D97-AF65-F5344CB8AC3E}">
-        <p14:creationId xmlns="" xmlns:p14="http://schemas.microsoft.com/office/powerpoint/2010/main" val="4046931998"/>
+        <p14:creationId xmlns:p14="http://schemas.microsoft.com/office/powerpoint/2010/main" val="4046931998"/>
       </p:ext>
     </p:extLst>
   </p:cSld>
@@ -4845,7 +4845,7 @@
           <a:blip r:embed="rId2" cstate="print">
             <a:extLst>
               <a:ext uri="{28A0092B-C50C-407E-A947-70E740481C1C}">
-                <a14:useLocalDpi xmlns="" xmlns:a14="http://schemas.microsoft.com/office/drawing/2010/main" val="0"/>
+                <a14:useLocalDpi xmlns:a14="http://schemas.microsoft.com/office/drawing/2010/main" val="0"/>
               </a:ext>
             </a:extLst>
           </a:blip>
@@ -4866,7 +4866,7 @@
     </p:spTree>
     <p:extLst>
       <p:ext uri="{BB962C8B-B14F-4D97-AF65-F5344CB8AC3E}">
-        <p14:creationId xmlns="" xmlns:p14="http://schemas.microsoft.com/office/powerpoint/2010/main" val="1667147901"/>
+        <p14:creationId xmlns:p14="http://schemas.microsoft.com/office/powerpoint/2010/main" val="1667147901"/>
       </p:ext>
     </p:extLst>
   </p:cSld>
@@ -4948,7 +4948,7 @@
     </p:spTree>
     <p:extLst>
       <p:ext uri="{BB962C8B-B14F-4D97-AF65-F5344CB8AC3E}">
-        <p14:creationId xmlns="" xmlns:p14="http://schemas.microsoft.com/office/powerpoint/2010/main" val="3295011282"/>
+        <p14:creationId xmlns:p14="http://schemas.microsoft.com/office/powerpoint/2010/main" val="3295011282"/>
       </p:ext>
     </p:extLst>
   </p:cSld>
@@ -5163,7 +5163,7 @@
     </p:spTree>
     <p:extLst>
       <p:ext uri="{BB962C8B-B14F-4D97-AF65-F5344CB8AC3E}">
-        <p14:creationId xmlns="" xmlns:p14="http://schemas.microsoft.com/office/powerpoint/2010/main" val="2734673817"/>
+        <p14:creationId xmlns:p14="http://schemas.microsoft.com/office/powerpoint/2010/main" val="2734673817"/>
       </p:ext>
     </p:extLst>
   </p:cSld>
@@ -5312,7 +5312,7 @@
     </p:spTree>
     <p:extLst>
       <p:ext uri="{BB962C8B-B14F-4D97-AF65-F5344CB8AC3E}">
-        <p14:creationId xmlns="" xmlns:p14="http://schemas.microsoft.com/office/powerpoint/2010/main" val="2938960995"/>
+        <p14:creationId xmlns:p14="http://schemas.microsoft.com/office/powerpoint/2010/main" val="2938960995"/>
       </p:ext>
     </p:extLst>
   </p:cSld>
@@ -5771,7 +5771,7 @@
     </p:spTree>
     <p:extLst>
       <p:ext uri="{BB962C8B-B14F-4D97-AF65-F5344CB8AC3E}">
-        <p14:creationId xmlns="" xmlns:p14="http://schemas.microsoft.com/office/powerpoint/2010/main" val="2926360070"/>
+        <p14:creationId xmlns:p14="http://schemas.microsoft.com/office/powerpoint/2010/main" val="2926360070"/>
       </p:ext>
     </p:extLst>
   </p:cSld>
@@ -5897,7 +5897,7 @@
     </p:spTree>
     <p:extLst>
       <p:ext uri="{BB962C8B-B14F-4D97-AF65-F5344CB8AC3E}">
-        <p14:creationId xmlns="" xmlns:p14="http://schemas.microsoft.com/office/powerpoint/2010/main" val="2129186102"/>
+        <p14:creationId xmlns:p14="http://schemas.microsoft.com/office/powerpoint/2010/main" val="2129186102"/>
       </p:ext>
     </p:extLst>
   </p:cSld>
@@ -5987,7 +5987,7 @@
     </p:spTree>
     <p:extLst>
       <p:ext uri="{BB962C8B-B14F-4D97-AF65-F5344CB8AC3E}">
-        <p14:creationId xmlns="" xmlns:p14="http://schemas.microsoft.com/office/powerpoint/2010/main" val="3566729274"/>
+        <p14:creationId xmlns:p14="http://schemas.microsoft.com/office/powerpoint/2010/main" val="3566729274"/>
       </p:ext>
     </p:extLst>
   </p:cSld>
@@ -6049,7 +6049,7 @@
     </p:spTree>
     <p:extLst>
       <p:ext uri="{BB962C8B-B14F-4D97-AF65-F5344CB8AC3E}">
-        <p14:creationId xmlns="" xmlns:p14="http://schemas.microsoft.com/office/powerpoint/2010/main" val="3452148279"/>
+        <p14:creationId xmlns:p14="http://schemas.microsoft.com/office/powerpoint/2010/main" val="3452148279"/>
       </p:ext>
     </p:extLst>
   </p:cSld>
@@ -6242,7 +6242,7 @@
     </p:spTree>
     <p:extLst>
       <p:ext uri="{BB962C8B-B14F-4D97-AF65-F5344CB8AC3E}">
-        <p14:creationId xmlns="" xmlns:p14="http://schemas.microsoft.com/office/powerpoint/2010/main" val="964902408"/>
+        <p14:creationId xmlns:p14="http://schemas.microsoft.com/office/powerpoint/2010/main" val="964902408"/>
       </p:ext>
     </p:extLst>
   </p:cSld>
@@ -6652,7 +6652,7 @@
     </p:spTree>
     <p:extLst>
       <p:ext uri="{BB962C8B-B14F-4D97-AF65-F5344CB8AC3E}">
-        <p14:creationId xmlns="" xmlns:p14="http://schemas.microsoft.com/office/powerpoint/2010/main" val="2273179978"/>
+        <p14:creationId xmlns:p14="http://schemas.microsoft.com/office/powerpoint/2010/main" val="2273179978"/>
       </p:ext>
     </p:extLst>
   </p:cSld>
@@ -6746,7 +6746,7 @@
     </p:spTree>
     <p:extLst>
       <p:ext uri="{BB962C8B-B14F-4D97-AF65-F5344CB8AC3E}">
-        <p14:creationId xmlns="" xmlns:p14="http://schemas.microsoft.com/office/powerpoint/2010/main" val="3074537217"/>
+        <p14:creationId xmlns:p14="http://schemas.microsoft.com/office/powerpoint/2010/main" val="3074537217"/>
       </p:ext>
     </p:extLst>
   </p:cSld>
@@ -6930,7 +6930,7 @@
     </p:spTree>
     <p:extLst>
       <p:ext uri="{BB962C8B-B14F-4D97-AF65-F5344CB8AC3E}">
-        <p14:creationId xmlns="" xmlns:p14="http://schemas.microsoft.com/office/powerpoint/2010/main" val="1505823429"/>
+        <p14:creationId xmlns:p14="http://schemas.microsoft.com/office/powerpoint/2010/main" val="1505823429"/>
       </p:ext>
     </p:extLst>
   </p:cSld>
@@ -7114,7 +7114,7 @@
     </p:spTree>
     <p:extLst>
       <p:ext uri="{BB962C8B-B14F-4D97-AF65-F5344CB8AC3E}">
-        <p14:creationId xmlns="" xmlns:p14="http://schemas.microsoft.com/office/powerpoint/2010/main" val="2799699760"/>
+        <p14:creationId xmlns:p14="http://schemas.microsoft.com/office/powerpoint/2010/main" val="2799699760"/>
       </p:ext>
     </p:extLst>
   </p:cSld>
@@ -7295,7 +7295,7 @@
     </p:spTree>
     <p:extLst>
       <p:ext uri="{BB962C8B-B14F-4D97-AF65-F5344CB8AC3E}">
-        <p14:creationId xmlns="" xmlns:p14="http://schemas.microsoft.com/office/powerpoint/2010/main" val="4077440827"/>
+        <p14:creationId xmlns:p14="http://schemas.microsoft.com/office/powerpoint/2010/main" val="4077440827"/>
       </p:ext>
     </p:extLst>
   </p:cSld>
@@ -7569,7 +7569,7 @@
     </p:spTree>
     <p:extLst>
       <p:ext uri="{BB962C8B-B14F-4D97-AF65-F5344CB8AC3E}">
-        <p14:creationId xmlns="" xmlns:p14="http://schemas.microsoft.com/office/powerpoint/2010/main" val="1364938391"/>
+        <p14:creationId xmlns:p14="http://schemas.microsoft.com/office/powerpoint/2010/main" val="1364938391"/>
       </p:ext>
     </p:extLst>
   </p:cSld>
@@ -7631,7 +7631,7 @@
     </p:spTree>
     <p:extLst>
       <p:ext uri="{BB962C8B-B14F-4D97-AF65-F5344CB8AC3E}">
-        <p14:creationId xmlns="" xmlns:p14="http://schemas.microsoft.com/office/powerpoint/2010/main" val="155309004"/>
+        <p14:creationId xmlns:p14="http://schemas.microsoft.com/office/powerpoint/2010/main" val="155309004"/>
       </p:ext>
     </p:extLst>
   </p:cSld>
@@ -8024,7 +8024,7 @@
     </p:spTree>
     <p:extLst>
       <p:ext uri="{BB962C8B-B14F-4D97-AF65-F5344CB8AC3E}">
-        <p14:creationId xmlns="" xmlns:p14="http://schemas.microsoft.com/office/powerpoint/2010/main" val="2470204541"/>
+        <p14:creationId xmlns:p14="http://schemas.microsoft.com/office/powerpoint/2010/main" val="2470204541"/>
       </p:ext>
     </p:extLst>
   </p:cSld>
@@ -8152,6 +8152,13 @@
   <p:clrMapOvr>
     <a:masterClrMapping/>
   </p:clrMapOvr>
+  <p:timing>
+    <p:tnLst>
+      <p:par>
+        <p:cTn id="1" dur="indefinite" restart="never" nodeType="tmRoot"/>
+      </p:par>
+    </p:tnLst>
+  </p:timing>
 </p:sld>
 </file>
 
@@ -8205,7 +8212,7 @@
     </p:spTree>
     <p:extLst>
       <p:ext uri="{BB962C8B-B14F-4D97-AF65-F5344CB8AC3E}">
-        <p14:creationId xmlns="" xmlns:p14="http://schemas.microsoft.com/office/powerpoint/2010/main" val="3650041397"/>
+        <p14:creationId xmlns:p14="http://schemas.microsoft.com/office/powerpoint/2010/main" val="3650041397"/>
       </p:ext>
     </p:extLst>
   </p:cSld>
@@ -8935,7 +8942,7 @@
     </p:spTree>
     <p:extLst>
       <p:ext uri="{BB962C8B-B14F-4D97-AF65-F5344CB8AC3E}">
-        <p14:creationId xmlns="" xmlns:p14="http://schemas.microsoft.com/office/powerpoint/2010/main" val="2710754239"/>
+        <p14:creationId xmlns:p14="http://schemas.microsoft.com/office/powerpoint/2010/main" val="2710754239"/>
       </p:ext>
     </p:extLst>
   </p:cSld>
@@ -9045,7 +9052,7 @@
     </p:spTree>
     <p:extLst>
       <p:ext uri="{BB962C8B-B14F-4D97-AF65-F5344CB8AC3E}">
-        <p14:creationId xmlns="" xmlns:p14="http://schemas.microsoft.com/office/powerpoint/2010/main" val="511458075"/>
+        <p14:creationId xmlns:p14="http://schemas.microsoft.com/office/powerpoint/2010/main" val="511458075"/>
       </p:ext>
     </p:extLst>
   </p:cSld>
@@ -9226,7 +9233,7 @@
     </p:spTree>
     <p:extLst>
       <p:ext uri="{BB962C8B-B14F-4D97-AF65-F5344CB8AC3E}">
-        <p14:creationId xmlns="" xmlns:p14="http://schemas.microsoft.com/office/powerpoint/2010/main" val="556193400"/>
+        <p14:creationId xmlns:p14="http://schemas.microsoft.com/office/powerpoint/2010/main" val="556193400"/>
       </p:ext>
     </p:extLst>
   </p:cSld>
@@ -9695,7 +9702,7 @@
     </p:spTree>
     <p:extLst>
       <p:ext uri="{BB962C8B-B14F-4D97-AF65-F5344CB8AC3E}">
-        <p14:creationId xmlns="" xmlns:p14="http://schemas.microsoft.com/office/powerpoint/2010/main" val="2232273031"/>
+        <p14:creationId xmlns:p14="http://schemas.microsoft.com/office/powerpoint/2010/main" val="2232273031"/>
       </p:ext>
     </p:extLst>
   </p:cSld>
@@ -10038,7 +10045,7 @@
     </p:spTree>
     <p:extLst>
       <p:ext uri="{BB962C8B-B14F-4D97-AF65-F5344CB8AC3E}">
-        <p14:creationId xmlns="" xmlns:p14="http://schemas.microsoft.com/office/powerpoint/2010/main" val="326209813"/>
+        <p14:creationId xmlns:p14="http://schemas.microsoft.com/office/powerpoint/2010/main" val="326209813"/>
       </p:ext>
     </p:extLst>
   </p:cSld>
@@ -10390,7 +10397,7 @@
     </p:spTree>
     <p:extLst>
       <p:ext uri="{BB962C8B-B14F-4D97-AF65-F5344CB8AC3E}">
-        <p14:creationId xmlns="" xmlns:p14="http://schemas.microsoft.com/office/powerpoint/2010/main" val="1985172737"/>
+        <p14:creationId xmlns:p14="http://schemas.microsoft.com/office/powerpoint/2010/main" val="1985172737"/>
       </p:ext>
     </p:extLst>
   </p:cSld>
@@ -10667,7 +10674,7 @@
     </p:spTree>
     <p:extLst>
       <p:ext uri="{BB962C8B-B14F-4D97-AF65-F5344CB8AC3E}">
-        <p14:creationId xmlns="" xmlns:p14="http://schemas.microsoft.com/office/powerpoint/2010/main" val="3422045647"/>
+        <p14:creationId xmlns:p14="http://schemas.microsoft.com/office/powerpoint/2010/main" val="3422045647"/>
       </p:ext>
     </p:extLst>
   </p:cSld>
@@ -11015,7 +11022,7 @@
     </p:spTree>
     <p:extLst>
       <p:ext uri="{BB962C8B-B14F-4D97-AF65-F5344CB8AC3E}">
-        <p14:creationId xmlns="" xmlns:p14="http://schemas.microsoft.com/office/powerpoint/2010/main" val="4240310967"/>
+        <p14:creationId xmlns:p14="http://schemas.microsoft.com/office/powerpoint/2010/main" val="4240310967"/>
       </p:ext>
     </p:extLst>
   </p:cSld>
@@ -11218,7 +11225,7 @@
     </p:spTree>
     <p:extLst>
       <p:ext uri="{BB962C8B-B14F-4D97-AF65-F5344CB8AC3E}">
-        <p14:creationId xmlns="" xmlns:p14="http://schemas.microsoft.com/office/powerpoint/2010/main" val="1511441888"/>
+        <p14:creationId xmlns:p14="http://schemas.microsoft.com/office/powerpoint/2010/main" val="1511441888"/>
       </p:ext>
     </p:extLst>
   </p:cSld>
@@ -11584,7 +11591,7 @@
     </p:spTree>
     <p:extLst>
       <p:ext uri="{BB962C8B-B14F-4D97-AF65-F5344CB8AC3E}">
-        <p14:creationId xmlns="" xmlns:p14="http://schemas.microsoft.com/office/powerpoint/2010/main" val="1967050782"/>
+        <p14:creationId xmlns:p14="http://schemas.microsoft.com/office/powerpoint/2010/main" val="1967050782"/>
       </p:ext>
     </p:extLst>
   </p:cSld>
@@ -11841,7 +11848,7 @@
     </p:spTree>
     <p:extLst>
       <p:ext uri="{BB962C8B-B14F-4D97-AF65-F5344CB8AC3E}">
-        <p14:creationId xmlns="" xmlns:p14="http://schemas.microsoft.com/office/powerpoint/2010/main" val="293374804"/>
+        <p14:creationId xmlns:p14="http://schemas.microsoft.com/office/powerpoint/2010/main" val="293374804"/>
       </p:ext>
     </p:extLst>
   </p:cSld>
@@ -11992,7 +11999,7 @@
     </p:spTree>
     <p:extLst>
       <p:ext uri="{BB962C8B-B14F-4D97-AF65-F5344CB8AC3E}">
-        <p14:creationId xmlns="" xmlns:p14="http://schemas.microsoft.com/office/powerpoint/2010/main" val="3705054776"/>
+        <p14:creationId xmlns:p14="http://schemas.microsoft.com/office/powerpoint/2010/main" val="3705054776"/>
       </p:ext>
     </p:extLst>
   </p:cSld>
@@ -12132,7 +12139,7 @@
     </p:spTree>
     <p:extLst>
       <p:ext uri="{BB962C8B-B14F-4D97-AF65-F5344CB8AC3E}">
-        <p14:creationId xmlns="" xmlns:p14="http://schemas.microsoft.com/office/powerpoint/2010/main" val="3715002187"/>
+        <p14:creationId xmlns:p14="http://schemas.microsoft.com/office/powerpoint/2010/main" val="3715002187"/>
       </p:ext>
     </p:extLst>
   </p:cSld>
@@ -12225,7 +12232,7 @@
     </p:spTree>
     <p:extLst>
       <p:ext uri="{BB962C8B-B14F-4D97-AF65-F5344CB8AC3E}">
-        <p14:creationId xmlns="" xmlns:p14="http://schemas.microsoft.com/office/powerpoint/2010/main" val="4164306444"/>
+        <p14:creationId xmlns:p14="http://schemas.microsoft.com/office/powerpoint/2010/main" val="4164306444"/>
       </p:ext>
     </p:extLst>
   </p:cSld>
@@ -12285,7 +12292,7 @@
     </p:spTree>
     <p:extLst>
       <p:ext uri="{BB962C8B-B14F-4D97-AF65-F5344CB8AC3E}">
-        <p14:creationId xmlns="" xmlns:p14="http://schemas.microsoft.com/office/powerpoint/2010/main" val="2259103098"/>
+        <p14:creationId xmlns:p14="http://schemas.microsoft.com/office/powerpoint/2010/main" val="2259103098"/>
       </p:ext>
     </p:extLst>
   </p:cSld>
@@ -12536,42 +12543,24 @@
                 <a:ea typeface="Roboto" pitchFamily="2" charset="0"/>
                 <a:hlinkClick r:id="rId3"/>
               </a:rPr>
-              <a:t>http://thenounproject.com/noun/first-aid/#</a:t>
-            </a:r>
-            <a:r>
-              <a:rPr lang="de-DE" sz="1200" dirty="0" smtClean="0">
+              <a:t>http://thenounproject.com/noun/first-aid</a:t>
+            </a:r>
+            <a:r>
+              <a:rPr lang="de-DE" sz="1200">
                 <a:latin typeface="Roboto" pitchFamily="2" charset="0"/>
                 <a:ea typeface="Roboto" pitchFamily="2" charset="0"/>
                 <a:hlinkClick r:id="rId3"/>
               </a:rPr>
+              <a:t>/#</a:t>
+            </a:r>
+            <a:r>
+              <a:rPr lang="de-DE" sz="1200" smtClean="0">
+                <a:latin typeface="Roboto" pitchFamily="2" charset="0"/>
+                <a:ea typeface="Roboto" pitchFamily="2" charset="0"/>
+                <a:hlinkClick r:id="rId3"/>
+              </a:rPr>
               <a:t>icon-No2208</a:t>
             </a:r>
-            <a:r>
-              <a:rPr lang="de-DE" sz="1200" dirty="0" smtClean="0">
-                <a:latin typeface="Roboto" pitchFamily="2" charset="0"/>
-                <a:ea typeface="Roboto" pitchFamily="2" charset="0"/>
-              </a:rPr>
-              <a:t/>
-            </a:r>
-            <a:br>
-              <a:rPr lang="de-DE" sz="1200" dirty="0" smtClean="0">
-                <a:latin typeface="Roboto" pitchFamily="2" charset="0"/>
-                <a:ea typeface="Roboto" pitchFamily="2" charset="0"/>
-              </a:rPr>
-            </a:br>
-            <a:r>
-              <a:rPr lang="de-DE" sz="1200" dirty="0" smtClean="0">
-                <a:latin typeface="Roboto" pitchFamily="2" charset="0"/>
-                <a:ea typeface="Roboto" pitchFamily="2" charset="0"/>
-              </a:rPr>
-              <a:t/>
-            </a:r>
-            <a:br>
-              <a:rPr lang="de-DE" sz="1200" dirty="0" smtClean="0">
-                <a:latin typeface="Roboto" pitchFamily="2" charset="0"/>
-                <a:ea typeface="Roboto" pitchFamily="2" charset="0"/>
-              </a:rPr>
-            </a:br>
             <a:r>
               <a:rPr lang="de-DE" sz="1200" dirty="0">
                 <a:latin typeface="Roboto" pitchFamily="2" charset="0"/>
@@ -14292,7 +14281,7 @@
           <a:blip r:embed="rId6" cstate="print">
             <a:extLst>
               <a:ext uri="{BEBA8EAE-BF5A-486C-A8C5-ECC9F3942E4B}">
-                <a14:imgProps xmlns="" xmlns:a14="http://schemas.microsoft.com/office/drawing/2010/main">
+                <a14:imgProps xmlns:a14="http://schemas.microsoft.com/office/drawing/2010/main">
                   <a14:imgLayer r:embed="rId7">
                     <a14:imgEffect>
                       <a14:backgroundRemoval t="0" b="100000" l="11914" r="86719"/>
@@ -14301,7 +14290,7 @@
                 </a14:imgProps>
               </a:ext>
               <a:ext uri="{28A0092B-C50C-407E-A947-70E740481C1C}">
-                <a14:useLocalDpi xmlns="" xmlns:a14="http://schemas.microsoft.com/office/drawing/2010/main" val="0"/>
+                <a14:useLocalDpi xmlns:a14="http://schemas.microsoft.com/office/drawing/2010/main" val="0"/>
               </a:ext>
             </a:extLst>
           </a:blip>
@@ -14321,7 +14310,7 @@
           <a:noFill/>
           <a:extLst>
             <a:ext uri="{909E8E84-426E-40DD-AFC4-6F175D3DCCD1}">
-              <a14:hiddenFill xmlns="" xmlns:a14="http://schemas.microsoft.com/office/drawing/2010/main">
+              <a14:hiddenFill xmlns:a14="http://schemas.microsoft.com/office/drawing/2010/main">
                 <a:solidFill>
                   <a:srgbClr val="FFFFFF"/>
                 </a:solidFill>
@@ -14379,7 +14368,7 @@
           <a:blip r:embed="rId8" cstate="print">
             <a:extLst>
               <a:ext uri="{28A0092B-C50C-407E-A947-70E740481C1C}">
-                <a14:useLocalDpi xmlns="" xmlns:a14="http://schemas.microsoft.com/office/drawing/2010/main" val="0"/>
+                <a14:useLocalDpi xmlns:a14="http://schemas.microsoft.com/office/drawing/2010/main" val="0"/>
               </a:ext>
             </a:extLst>
           </a:blip>
@@ -14399,7 +14388,7 @@
           <a:noFill/>
           <a:extLst>
             <a:ext uri="{909E8E84-426E-40DD-AFC4-6F175D3DCCD1}">
-              <a14:hiddenFill xmlns="" xmlns:a14="http://schemas.microsoft.com/office/drawing/2010/main">
+              <a14:hiddenFill xmlns:a14="http://schemas.microsoft.com/office/drawing/2010/main">
                 <a:solidFill>
                   <a:srgbClr val="FFFFFF"/>
                 </a:solidFill>
@@ -14411,7 +14400,7 @@
     </p:spTree>
     <p:extLst>
       <p:ext uri="{BB962C8B-B14F-4D97-AF65-F5344CB8AC3E}">
-        <p14:creationId xmlns="" xmlns:p14="http://schemas.microsoft.com/office/powerpoint/2010/main" val="3041060604"/>
+        <p14:creationId xmlns:p14="http://schemas.microsoft.com/office/powerpoint/2010/main" val="3041060604"/>
       </p:ext>
     </p:extLst>
   </p:cSld>
@@ -22341,43 +22330,25 @@
                 </a:solidFill>
                 <a:ea typeface="Roboto" pitchFamily="2" charset="0"/>
               </a:rPr>
-              <a:t> </a:t>
-            </a:r>
-            <a:r>
-              <a:rPr lang="en-US" sz="4400" dirty="0" smtClean="0">
+              <a:t> Heinrich Heine, </a:t>
+            </a:r>
+            <a:r>
+              <a:rPr lang="en-US" sz="4400" dirty="0" err="1" smtClean="0">
                 <a:solidFill>
                   <a:srgbClr val="FF7400"/>
                 </a:solidFill>
                 <a:ea typeface="Roboto" pitchFamily="2" charset="0"/>
               </a:rPr>
-              <a:t>Heinrich Heine, </a:t>
-            </a:r>
-            <a:r>
-              <a:rPr lang="en-US" sz="4400" dirty="0" err="1" smtClean="0">
+              <a:t>Loreley</a:t>
+            </a:r>
+            <a:r>
+              <a:rPr lang="en-US" sz="4400" smtClean="0">
                 <a:solidFill>
                   <a:srgbClr val="FF7400"/>
                 </a:solidFill>
                 <a:ea typeface="Roboto" pitchFamily="2" charset="0"/>
               </a:rPr>
-              <a:t>Loreley</a:t>
-            </a:r>
-            <a:r>
-              <a:rPr lang="en-US" sz="4400" smtClean="0">
-                <a:solidFill>
-                  <a:srgbClr val="FF7400"/>
-                </a:solidFill>
-                <a:ea typeface="Roboto" pitchFamily="2" charset="0"/>
-              </a:rPr>
-              <a:t>, </a:t>
-            </a:r>
-            <a:r>
-              <a:rPr lang="en-US" sz="4400" smtClean="0">
-                <a:solidFill>
-                  <a:srgbClr val="FF7400"/>
-                </a:solidFill>
-                <a:ea typeface="Roboto" pitchFamily="2" charset="0"/>
-              </a:rPr>
-              <a:t>1824</a:t>
+              <a:t>, 1824</a:t>
             </a:r>
             <a:endParaRPr lang="en-US" sz="2800" dirty="0">
               <a:solidFill>
@@ -29004,7 +28975,7 @@
     </p:spTree>
     <p:extLst>
       <p:ext uri="{BB962C8B-B14F-4D97-AF65-F5344CB8AC3E}">
-        <p14:creationId xmlns="" xmlns:p14="http://schemas.microsoft.com/office/powerpoint/2010/main" val="1585547321"/>
+        <p14:creationId xmlns:p14="http://schemas.microsoft.com/office/powerpoint/2010/main" val="1585547321"/>
       </p:ext>
     </p:extLst>
   </p:cSld>
@@ -29571,6 +29542,13 @@
   <p:clrMapOvr>
     <a:masterClrMapping/>
   </p:clrMapOvr>
+  <p:timing>
+    <p:tnLst>
+      <p:par>
+        <p:cTn id="1" dur="indefinite" restart="never" nodeType="tmRoot"/>
+      </p:par>
+    </p:tnLst>
+  </p:timing>
 </p:sld>
 </file>
 
@@ -31734,7 +31712,7 @@
     </p:spTree>
     <p:extLst>
       <p:ext uri="{BB962C8B-B14F-4D97-AF65-F5344CB8AC3E}">
-        <p14:creationId xmlns="" xmlns:p14="http://schemas.microsoft.com/office/powerpoint/2010/main" val="4080653139"/>
+        <p14:creationId xmlns:p14="http://schemas.microsoft.com/office/powerpoint/2010/main" val="4080653139"/>
       </p:ext>
     </p:extLst>
   </p:cSld>
@@ -31811,7 +31789,7 @@
     </p:spTree>
     <p:extLst>
       <p:ext uri="{BB962C8B-B14F-4D97-AF65-F5344CB8AC3E}">
-        <p14:creationId xmlns="" xmlns:p14="http://schemas.microsoft.com/office/powerpoint/2010/main" val="3486408693"/>
+        <p14:creationId xmlns:p14="http://schemas.microsoft.com/office/powerpoint/2010/main" val="3486408693"/>
       </p:ext>
     </p:extLst>
   </p:cSld>
@@ -31888,7 +31866,7 @@
     </p:spTree>
     <p:extLst>
       <p:ext uri="{BB962C8B-B14F-4D97-AF65-F5344CB8AC3E}">
-        <p14:creationId xmlns="" xmlns:p14="http://schemas.microsoft.com/office/powerpoint/2010/main" val="1700360724"/>
+        <p14:creationId xmlns:p14="http://schemas.microsoft.com/office/powerpoint/2010/main" val="1700360724"/>
       </p:ext>
     </p:extLst>
   </p:cSld>
@@ -31955,7 +31933,7 @@
     </p:spTree>
     <p:extLst>
       <p:ext uri="{BB962C8B-B14F-4D97-AF65-F5344CB8AC3E}">
-        <p14:creationId xmlns="" xmlns:p14="http://schemas.microsoft.com/office/powerpoint/2010/main" val="2686215552"/>
+        <p14:creationId xmlns:p14="http://schemas.microsoft.com/office/powerpoint/2010/main" val="2686215552"/>
       </p:ext>
     </p:extLst>
   </p:cSld>
@@ -32038,7 +32016,7 @@
     </p:spTree>
     <p:extLst>
       <p:ext uri="{BB962C8B-B14F-4D97-AF65-F5344CB8AC3E}">
-        <p14:creationId xmlns="" xmlns:p14="http://schemas.microsoft.com/office/powerpoint/2010/main" val="667148433"/>
+        <p14:creationId xmlns:p14="http://schemas.microsoft.com/office/powerpoint/2010/main" val="667148433"/>
       </p:ext>
     </p:extLst>
   </p:cSld>
@@ -32124,7 +32102,7 @@
     </p:spTree>
     <p:extLst>
       <p:ext uri="{BB962C8B-B14F-4D97-AF65-F5344CB8AC3E}">
-        <p14:creationId xmlns="" xmlns:p14="http://schemas.microsoft.com/office/powerpoint/2010/main" val="600638369"/>
+        <p14:creationId xmlns:p14="http://schemas.microsoft.com/office/powerpoint/2010/main" val="600638369"/>
       </p:ext>
     </p:extLst>
   </p:cSld>
@@ -32237,7 +32215,7 @@
     </p:spTree>
     <p:extLst>
       <p:ext uri="{BB962C8B-B14F-4D97-AF65-F5344CB8AC3E}">
-        <p14:creationId xmlns="" xmlns:p14="http://schemas.microsoft.com/office/powerpoint/2010/main" val="1550625721"/>
+        <p14:creationId xmlns:p14="http://schemas.microsoft.com/office/powerpoint/2010/main" val="1550625721"/>
       </p:ext>
     </p:extLst>
   </p:cSld>
@@ -32371,7 +32349,7 @@
     </p:spTree>
     <p:extLst>
       <p:ext uri="{BB962C8B-B14F-4D97-AF65-F5344CB8AC3E}">
-        <p14:creationId xmlns="" xmlns:p14="http://schemas.microsoft.com/office/powerpoint/2010/main" val="480640005"/>
+        <p14:creationId xmlns:p14="http://schemas.microsoft.com/office/powerpoint/2010/main" val="480640005"/>
       </p:ext>
     </p:extLst>
   </p:cSld>

</xml_diff>